<commit_message>
Updated Data types & added 2 new research questions
</commit_message>
<xml_diff>
--- a/Ds115 Team Research.pptx
+++ b/Ds115 Team Research.pptx
@@ -151,15 +151,6 @@
 </p:presentation>
 </file>
 
-<file path=ppt/revisionInfo.xml><?xml version="1.0" encoding="utf-8"?>
-<p1510:revInfo xmlns:a="http://schemas.openxmlformats.org/drawingml/2006/main" xmlns:r="http://schemas.openxmlformats.org/officeDocument/2006/relationships" xmlns:p1510="http://schemas.microsoft.com/office/powerpoint/2015/10/main">
-  <p1510:revLst>
-    <p1510:client id="{791712A2-3D2D-6720-DA7A-FD01D439E3A5}" v="36" dt="2024-10-28T14:24:22.639"/>
-    <p1510:client id="{D9B6ED81-318B-491F-AB62-15CCFBC1E1F1}" v="1" dt="2024-10-28T14:32:52.146"/>
-  </p1510:revLst>
-</p1510:revInfo>
-</file>
-
 <file path=ppt/handoutMasters/handoutMaster1.xml><?xml version="1.0" encoding="utf-8"?>
 <p:handoutMaster xmlns:a="http://schemas.openxmlformats.org/drawingml/2006/main" xmlns:r="http://schemas.openxmlformats.org/officeDocument/2006/relationships" xmlns:p="http://schemas.openxmlformats.org/presentationml/2006/main">
   <p:cSld>
@@ -255,7 +246,7 @@
             <a:fld id="{93FAAC3A-BD1F-4A00-9099-74B95789FE00}" type="datetimeFigureOut">
               <a:rPr lang="en-GB" smtClean="0"/>
               <a:pPr/>
-              <a:t>28/10/2024</a:t>
+              <a:t>30/10/2024</a:t>
             </a:fld>
             <a:endParaRPr lang="en-GB"/>
           </a:p>
@@ -434,7 +425,7 @@
             <a:fld id="{8E359C8A-39F6-4045-9163-4042C4C26B15}" type="datetimeFigureOut">
               <a:rPr lang="en-GB" smtClean="0"/>
               <a:pPr/>
-              <a:t>28/10/2024</a:t>
+              <a:t>30/10/2024</a:t>
             </a:fld>
             <a:endParaRPr lang="en-GB"/>
           </a:p>
@@ -4698,28 +4689,24 @@
           </a:bodyPr>
           <a:lstStyle/>
           <a:p>
-            <a:r>
-              <a:rPr lang="en-US" sz="4000"/>
-              <a:t>What is the correlation between Flight duration &amp; Ticket prices for domestic flights in India?</a:t>
-            </a:r>
             <a:br>
-              <a:rPr lang="en-US" sz="8000"/>
+              <a:rPr lang="en-US" sz="8000" dirty="0"/>
             </a:br>
             <a:br>
-              <a:rPr lang="en-US" sz="4000"/>
+              <a:rPr lang="en-US" sz="4000" dirty="0"/>
             </a:br>
             <a:r>
-              <a:rPr lang="en-US" sz="4000"/>
+              <a:rPr lang="en-US" sz="4000" dirty="0"/>
               <a:t>									</a:t>
             </a:r>
             <a:r>
-              <a:rPr lang="en-US" sz="2200"/>
+              <a:rPr lang="en-US" sz="2200" dirty="0"/>
               <a:t>Date:  28/10/2024</a:t>
             </a:r>
             <a:br>
-              <a:rPr lang="en-US" sz="8000"/>
+              <a:rPr lang="en-US" sz="8000" dirty="0"/>
             </a:br>
-            <a:endParaRPr lang="en-US"/>
+            <a:endParaRPr lang="en-US" dirty="0"/>
           </a:p>
         </p:txBody>
       </p:sp>
@@ -5016,14 +5003,14 @@
               </a:lnSpc>
             </a:pPr>
             <a:r>
-              <a:rPr lang="en-US" sz="2400" b="0">
+              <a:rPr lang="en-US" sz="2400" b="0" dirty="0">
                 <a:latin typeface="Calibri"/>
                 <a:cs typeface="Calibri"/>
               </a:rPr>
               <a:t>This dataset is interesting to us because </a:t>
             </a:r>
             <a:r>
-              <a:rPr lang="en-US" sz="2400" b="0">
+              <a:rPr lang="en-US" sz="2400" b="0" dirty="0">
                 <a:solidFill>
                   <a:schemeClr val="accent2">
                     <a:lumMod val="75000"/>
@@ -5036,7 +5023,7 @@
               <a:t>t</a:t>
             </a:r>
             <a:r>
-              <a:rPr lang="en-US" sz="2400" b="0">
+              <a:rPr lang="en-US" sz="2400" b="0" dirty="0">
                 <a:solidFill>
                   <a:schemeClr val="accent2">
                     <a:lumMod val="75000"/>
@@ -5048,26 +5035,26 @@
               <a:t>his dataset is interesting because it provides a clear view into India’s competitive aviation market, offering insights on pricing strategies, peak travel timings, and traveler preferences on high-demand routes. It’s valuable for both travelers looking to optimize costs and for businesses studying market behavior in one of the world’s largest aviation hubs. </a:t>
             </a:r>
             <a:br>
-              <a:rPr lang="en-US" sz="2200" b="0">
+              <a:rPr lang="en-US" sz="2200" b="0" dirty="0">
                 <a:ea typeface="+mj-lt"/>
                 <a:cs typeface="+mj-lt"/>
               </a:rPr>
             </a:br>
             <a:br>
-              <a:rPr lang="en-US" sz="2400" b="0">
+              <a:rPr lang="en-US" sz="2400" b="0" dirty="0">
                 <a:latin typeface="Calibri"/>
                 <a:cs typeface="Calibri" panose="020F0502020204030204" pitchFamily="34" charset="0"/>
               </a:rPr>
             </a:br>
             <a:r>
-              <a:rPr lang="en-US" sz="2400" b="0">
+              <a:rPr lang="en-US" sz="2400" b="0" dirty="0">
                 <a:latin typeface="Calibri"/>
                 <a:cs typeface="Calibri"/>
               </a:rPr>
               <a:t>Our  Independent variable is: </a:t>
             </a:r>
             <a:r>
-              <a:rPr lang="en-US" sz="2400" b="0">
+              <a:rPr lang="en-US" sz="2400" b="0" dirty="0">
                 <a:solidFill>
                   <a:schemeClr val="accent2">
                     <a:lumMod val="76000"/>
@@ -5079,7 +5066,7 @@
               <a:t>Flight</a:t>
             </a:r>
             <a:r>
-              <a:rPr lang="en-US" sz="2400">
+              <a:rPr lang="en-US" sz="2400" dirty="0">
                 <a:solidFill>
                   <a:schemeClr val="accent2">
                     <a:lumMod val="76000"/>
@@ -5091,7 +5078,7 @@
               <a:t> </a:t>
             </a:r>
             <a:r>
-              <a:rPr lang="en-US" sz="2400" b="0">
+              <a:rPr lang="en-US" sz="2400" b="0" dirty="0">
                 <a:solidFill>
                   <a:schemeClr val="accent2">
                     <a:lumMod val="76000"/>
@@ -5103,13 +5090,13 @@
               <a:t>Duration</a:t>
             </a:r>
             <a:br>
-              <a:rPr lang="en-US" sz="2400">
+              <a:rPr lang="en-US" sz="2400" dirty="0">
                 <a:latin typeface="Calibri"/>
                 <a:cs typeface="Calibri"/>
               </a:rPr>
             </a:br>
             <a:r>
-              <a:rPr lang="en-US" sz="2400" b="0">
+              <a:rPr lang="en-US" sz="2400" b="0" dirty="0">
                 <a:solidFill>
                   <a:srgbClr val="FF0000"/>
                 </a:solidFill>
@@ -5119,24 +5106,24 @@
               <a:t>                   </a:t>
             </a:r>
             <a:r>
-              <a:rPr lang="en-US" sz="2400" b="0">
+              <a:rPr lang="en-US" sz="2400" b="0" dirty="0">
                 <a:latin typeface="Calibri"/>
                 <a:cs typeface="Calibri"/>
               </a:rPr>
               <a:t>This  Independent variable datatype is : </a:t>
             </a:r>
             <a:r>
-              <a:rPr lang="en-US" sz="2400" b="0">
+              <a:rPr lang="en-US" sz="2400" b="0" dirty="0">
                 <a:solidFill>
                   <a:srgbClr val="FF0000"/>
                 </a:solidFill>
                 <a:latin typeface="Calibri"/>
                 <a:cs typeface="Calibri"/>
               </a:rPr>
-              <a:t>Interval</a:t>
+              <a:t>Continuous</a:t>
             </a:r>
             <a:br>
-              <a:rPr lang="en-US" sz="2400" b="0">
+              <a:rPr lang="en-US" sz="2400" b="0" dirty="0">
                 <a:solidFill>
                   <a:srgbClr val="203232"/>
                 </a:solidFill>
@@ -5145,7 +5132,7 @@
               </a:rPr>
             </a:br>
             <a:r>
-              <a:rPr lang="en-US" sz="2400" b="0">
+              <a:rPr lang="en-US" sz="2400" b="0" dirty="0">
                 <a:solidFill>
                   <a:srgbClr val="203232"/>
                 </a:solidFill>
@@ -5155,14 +5142,14 @@
               <a:t>Our</a:t>
             </a:r>
             <a:r>
-              <a:rPr lang="en-US" sz="2400" b="0">
+              <a:rPr lang="en-US" sz="2400" b="0" dirty="0">
                 <a:latin typeface="Calibri"/>
                 <a:cs typeface="Calibri"/>
               </a:rPr>
               <a:t> Dependent variable is: </a:t>
             </a:r>
             <a:r>
-              <a:rPr lang="en-US" sz="2400" b="0">
+              <a:rPr lang="en-US" sz="2400" b="0" dirty="0">
                 <a:solidFill>
                   <a:schemeClr val="accent2">
                     <a:lumMod val="76000"/>
@@ -5174,13 +5161,13 @@
               <a:t>Price</a:t>
             </a:r>
             <a:br>
-              <a:rPr lang="en-US" sz="2400" b="0">
+              <a:rPr lang="en-US" sz="2400" b="0" dirty="0">
                 <a:latin typeface="Calibri"/>
                 <a:cs typeface="Calibri"/>
               </a:rPr>
             </a:br>
             <a:r>
-              <a:rPr lang="en-US" sz="2400" b="0">
+              <a:rPr lang="en-US" sz="2400" b="0" dirty="0">
                 <a:solidFill>
                   <a:srgbClr val="FF0000"/>
                 </a:solidFill>
@@ -5190,21 +5177,21 @@
               <a:t>                   </a:t>
             </a:r>
             <a:r>
-              <a:rPr lang="en-US" sz="2400" b="0">
+              <a:rPr lang="en-US" sz="2400" b="0" dirty="0">
                 <a:latin typeface="Calibri"/>
                 <a:cs typeface="Calibri"/>
               </a:rPr>
               <a:t>This Dependent variable datatype is : </a:t>
             </a:r>
             <a:r>
-              <a:rPr lang="en-US" sz="2400" b="0">
+              <a:rPr lang="en-US" sz="2400" b="0" dirty="0">
                 <a:solidFill>
                   <a:srgbClr val="FF0000"/>
                 </a:solidFill>
                 <a:latin typeface="Calibri"/>
                 <a:cs typeface="Calibri"/>
               </a:rPr>
-              <a:t>Nominal</a:t>
+              <a:t>Continuous </a:t>
             </a:r>
           </a:p>
         </p:txBody>
@@ -5363,8 +5350,8 @@
         </p:nvSpPr>
         <p:spPr>
           <a:xfrm>
-            <a:off x="965289" y="1893914"/>
-            <a:ext cx="10640594" cy="2678085"/>
+            <a:off x="965289" y="1659468"/>
+            <a:ext cx="10640594" cy="2912532"/>
           </a:xfrm>
         </p:spPr>
         <p:txBody>
@@ -5379,19 +5366,26 @@
               </a:lnSpc>
             </a:pPr>
             <a:br>
-              <a:rPr lang="en-GB" sz="3600">
-                <a:effectLst/>
+              <a:rPr lang="en-GB" sz="3600" dirty="0">
                 <a:latin typeface="Calibri" panose="020F0502020204030204" pitchFamily="34" charset="0"/>
                 <a:ea typeface="Calibri" panose="020F0502020204030204" pitchFamily="34" charset="0"/>
                 <a:cs typeface="Times New Roman" panose="02020603050405020304" pitchFamily="18" charset="0"/>
               </a:rPr>
             </a:br>
             <a:r>
-              <a:rPr lang="en-US" sz="3600"/>
-              <a:t>What is the relation between </a:t>
-            </a:r>
-            <a:r>
-              <a:rPr lang="en-US" sz="3600">
+              <a:rPr lang="en-GB" sz="3600" dirty="0">
+                <a:latin typeface="Calibri" panose="020F0502020204030204" pitchFamily="34" charset="0"/>
+                <a:ea typeface="Calibri" panose="020F0502020204030204" pitchFamily="34" charset="0"/>
+                <a:cs typeface="Times New Roman" panose="02020603050405020304" pitchFamily="18" charset="0"/>
+              </a:rPr>
+              <a:t>Is there any</a:t>
+            </a:r>
+            <a:r>
+              <a:rPr lang="en-US" sz="3600" dirty="0"/>
+              <a:t> correlation between </a:t>
+            </a:r>
+            <a:r>
+              <a:rPr lang="en-US" sz="3600" dirty="0">
                 <a:solidFill>
                   <a:schemeClr val="accent2">
                     <a:lumMod val="75000"/>
@@ -5401,11 +5395,11 @@
               <a:t>Flight duration </a:t>
             </a:r>
             <a:r>
-              <a:rPr lang="en-US" sz="3600"/>
+              <a:rPr lang="en-US" sz="3600" dirty="0"/>
               <a:t>&amp; </a:t>
             </a:r>
             <a:r>
-              <a:rPr lang="en-US" sz="3600">
+              <a:rPr lang="en-US" sz="3600" dirty="0">
                 <a:solidFill>
                   <a:schemeClr val="accent2">
                     <a:lumMod val="75000"/>
@@ -5415,11 +5409,11 @@
               <a:t>Ticket prices</a:t>
             </a:r>
             <a:r>
-              <a:rPr lang="en-US" sz="3600"/>
+              <a:rPr lang="en-US" sz="3600" dirty="0"/>
               <a:t> for </a:t>
             </a:r>
             <a:r>
-              <a:rPr lang="en-US" sz="3600">
+              <a:rPr lang="en-US" sz="3600" dirty="0">
                 <a:solidFill>
                   <a:schemeClr val="accent2">
                     <a:lumMod val="75000"/>
@@ -5429,10 +5423,103 @@
               <a:t>domestic flights </a:t>
             </a:r>
             <a:r>
-              <a:rPr lang="en-US" sz="3600"/>
+              <a:rPr lang="en-US" sz="3600" dirty="0"/>
               <a:t>in India?</a:t>
             </a:r>
-            <a:endParaRPr lang="en-GB" sz="3600">
+            <a:br>
+              <a:rPr lang="en-US" sz="3600" dirty="0"/>
+            </a:br>
+            <a:r>
+              <a:rPr lang="en-US" sz="3600" dirty="0"/>
+              <a:t>Or </a:t>
+            </a:r>
+            <a:br>
+              <a:rPr lang="en-US" sz="3600" dirty="0"/>
+            </a:br>
+            <a:r>
+              <a:rPr lang="en-GB" sz="3600" dirty="0">
+                <a:latin typeface="Calibri" panose="020F0502020204030204" pitchFamily="34" charset="0"/>
+                <a:ea typeface="Calibri" panose="020F0502020204030204" pitchFamily="34" charset="0"/>
+                <a:cs typeface="Times New Roman" panose="02020603050405020304" pitchFamily="18" charset="0"/>
+              </a:rPr>
+              <a:t>Is there any</a:t>
+            </a:r>
+            <a:r>
+              <a:rPr lang="en-US" sz="3600" dirty="0"/>
+              <a:t> correlation between </a:t>
+            </a:r>
+            <a:r>
+              <a:rPr lang="en-US" sz="3600" dirty="0">
+                <a:solidFill>
+                  <a:schemeClr val="accent2">
+                    <a:lumMod val="75000"/>
+                  </a:schemeClr>
+                </a:solidFill>
+              </a:rPr>
+              <a:t>Flight duration </a:t>
+            </a:r>
+            <a:r>
+              <a:rPr lang="en-US" sz="3600" dirty="0"/>
+              <a:t>&amp; </a:t>
+            </a:r>
+            <a:r>
+              <a:rPr lang="en-US" sz="3600" dirty="0">
+                <a:solidFill>
+                  <a:schemeClr val="accent2">
+                    <a:lumMod val="75000"/>
+                  </a:schemeClr>
+                </a:solidFill>
+              </a:rPr>
+              <a:t>Ticket prices</a:t>
+            </a:r>
+            <a:r>
+              <a:rPr lang="en-US" sz="3600" dirty="0"/>
+              <a:t> for </a:t>
+            </a:r>
+            <a:r>
+              <a:rPr lang="en-US" sz="3600" dirty="0">
+                <a:solidFill>
+                  <a:schemeClr val="accent2">
+                    <a:lumMod val="75000"/>
+                  </a:schemeClr>
+                </a:solidFill>
+              </a:rPr>
+              <a:t>domestic flights departing from </a:t>
+            </a:r>
+            <a:r>
+              <a:rPr lang="en-US" sz="3600" dirty="0" err="1">
+                <a:solidFill>
+                  <a:schemeClr val="accent2">
+                    <a:lumMod val="75000"/>
+                  </a:schemeClr>
+                </a:solidFill>
+              </a:rPr>
+              <a:t>delhi</a:t>
+            </a:r>
+            <a:r>
+              <a:rPr lang="en-US" sz="3600" dirty="0">
+                <a:solidFill>
+                  <a:schemeClr val="accent2">
+                    <a:lumMod val="75000"/>
+                  </a:schemeClr>
+                </a:solidFill>
+              </a:rPr>
+              <a:t> </a:t>
+            </a:r>
+            <a:r>
+              <a:rPr lang="en-US" sz="3600" dirty="0"/>
+              <a:t>in India?</a:t>
+            </a:r>
+            <a:br>
+              <a:rPr lang="en-US" sz="3600" dirty="0"/>
+            </a:br>
+            <a:br>
+              <a:rPr lang="en-US" sz="3600" dirty="0"/>
+            </a:br>
+            <a:br>
+              <a:rPr lang="en-US" sz="3600" dirty="0"/>
+            </a:br>
+            <a:endParaRPr lang="en-GB" sz="3600" dirty="0">
               <a:solidFill>
                 <a:srgbClr val="FF0000"/>
               </a:solidFill>
@@ -6763,14 +6850,6 @@
 </file>
 
 <file path=customXml/item1.xml><?xml version="1.0" encoding="utf-8"?>
-<p:properties xmlns:p="http://schemas.microsoft.com/office/2006/metadata/properties" xmlns:xsi="http://www.w3.org/2001/XMLSchema-instance" xmlns:pc="http://schemas.microsoft.com/office/infopath/2007/PartnerControls">
-  <documentManagement>
-    <_activity xmlns="e0b66e2b-8ac0-4af7-b642-ec91160566fb" xsi:nil="true"/>
-  </documentManagement>
-</p:properties>
-</file>
-
-<file path=customXml/item2.xml><?xml version="1.0" encoding="utf-8"?>
 <ct:contentTypeSchema xmlns:ct="http://schemas.microsoft.com/office/2006/metadata/contentType" xmlns:ma="http://schemas.microsoft.com/office/2006/metadata/properties/metaAttributes" ct:_="" ma:_="" ma:contentTypeName="Document" ma:contentTypeID="0x0101009B7AB4019A25F14E9AEB5769007937FC" ma:contentTypeVersion="6" ma:contentTypeDescription="Create a new document." ma:contentTypeScope="" ma:versionID="e39f1abe86898bb34110ac7c8f633e2d">
   <xsd:schema xmlns:xsd="http://www.w3.org/2001/XMLSchema" xmlns:xs="http://www.w3.org/2001/XMLSchema" xmlns:p="http://schemas.microsoft.com/office/2006/metadata/properties" xmlns:ns3="e0b66e2b-8ac0-4af7-b642-ec91160566fb" targetNamespace="http://schemas.microsoft.com/office/2006/metadata/properties" ma:root="true" ma:fieldsID="2ecc8d36e7f985748b7213f4e0ac8a99" ns3:_="">
     <xsd:import namespace="e0b66e2b-8ac0-4af7-b642-ec91160566fb"/>
@@ -6926,7 +7005,7 @@
 </ct:contentTypeSchema>
 </file>
 
-<file path=customXml/item3.xml><?xml version="1.0" encoding="utf-8"?>
+<file path=customXml/item2.xml><?xml version="1.0" encoding="utf-8"?>
 <?mso-contentType ?>
 <FormTemplates xmlns="http://schemas.microsoft.com/sharepoint/v3/contenttype/forms">
   <Display>DocumentLibraryForm</Display>
@@ -6935,23 +7014,15 @@
 </FormTemplates>
 </file>
 
-<file path=customXml/itemProps1.xml><?xml version="1.0" encoding="utf-8"?>
-<ds:datastoreItem xmlns:ds="http://schemas.openxmlformats.org/officeDocument/2006/customXml" ds:itemID="{EDD1FC41-23C7-41B0-B5F9-BF4CD38AD2ED}">
-  <ds:schemaRefs>
-    <ds:schemaRef ds:uri="http://purl.org/dc/elements/1.1/"/>
-    <ds:schemaRef ds:uri="http://schemas.microsoft.com/office/2006/documentManagement/types"/>
-    <ds:schemaRef ds:uri="http://www.w3.org/XML/1998/namespace"/>
-    <ds:schemaRef ds:uri="http://schemas.openxmlformats.org/package/2006/metadata/core-properties"/>
-    <ds:schemaRef ds:uri="http://schemas.microsoft.com/office/2006/metadata/properties"/>
-    <ds:schemaRef ds:uri="e0b66e2b-8ac0-4af7-b642-ec91160566fb"/>
-    <ds:schemaRef ds:uri="http://purl.org/dc/dcmitype/"/>
-    <ds:schemaRef ds:uri="http://purl.org/dc/terms/"/>
-    <ds:schemaRef ds:uri="http://schemas.microsoft.com/office/infopath/2007/PartnerControls"/>
-  </ds:schemaRefs>
-</ds:datastoreItem>
+<file path=customXml/item3.xml><?xml version="1.0" encoding="utf-8"?>
+<p:properties xmlns:p="http://schemas.microsoft.com/office/2006/metadata/properties" xmlns:xsi="http://www.w3.org/2001/XMLSchema-instance" xmlns:pc="http://schemas.microsoft.com/office/infopath/2007/PartnerControls">
+  <documentManagement>
+    <_activity xmlns="e0b66e2b-8ac0-4af7-b642-ec91160566fb" xsi:nil="true"/>
+  </documentManagement>
+</p:properties>
 </file>
 
-<file path=customXml/itemProps2.xml><?xml version="1.0" encoding="utf-8"?>
+<file path=customXml/itemProps1.xml><?xml version="1.0" encoding="utf-8"?>
 <ds:datastoreItem xmlns:ds="http://schemas.openxmlformats.org/officeDocument/2006/customXml" ds:itemID="{07367F45-F2BC-4BD7-8140-D40435D374AB}">
   <ds:schemaRefs>
     <ds:schemaRef ds:uri="e0b66e2b-8ac0-4af7-b642-ec91160566fb"/>
@@ -6969,10 +7040,26 @@
 </ds:datastoreItem>
 </file>
 
-<file path=customXml/itemProps3.xml><?xml version="1.0" encoding="utf-8"?>
+<file path=customXml/itemProps2.xml><?xml version="1.0" encoding="utf-8"?>
 <ds:datastoreItem xmlns:ds="http://schemas.openxmlformats.org/officeDocument/2006/customXml" ds:itemID="{91C521DD-2673-4EE6-BB9B-DC5C3320FFBB}">
   <ds:schemaRefs>
     <ds:schemaRef ds:uri="http://schemas.microsoft.com/sharepoint/v3/contenttype/forms"/>
   </ds:schemaRefs>
 </ds:datastoreItem>
+</file>
+
+<file path=customXml/itemProps3.xml><?xml version="1.0" encoding="utf-8"?>
+<ds:datastoreItem xmlns:ds="http://schemas.openxmlformats.org/officeDocument/2006/customXml" ds:itemID="{EDD1FC41-23C7-41B0-B5F9-BF4CD38AD2ED}">
+  <ds:schemaRefs>
+    <ds:schemaRef ds:uri="http://schemas.microsoft.com/office/infopath/2007/PartnerControls"/>
+    <ds:schemaRef ds:uri="http://purl.org/dc/elements/1.1/"/>
+    <ds:schemaRef ds:uri="http://purl.org/dc/terms/"/>
+    <ds:schemaRef ds:uri="http://purl.org/dc/dcmitype/"/>
+    <ds:schemaRef ds:uri="http://schemas.openxmlformats.org/package/2006/metadata/core-properties"/>
+    <ds:schemaRef ds:uri="http://schemas.microsoft.com/office/2006/documentManagement/types"/>
+    <ds:schemaRef ds:uri="e0b66e2b-8ac0-4af7-b642-ec91160566fb"/>
+    <ds:schemaRef ds:uri="http://schemas.microsoft.com/office/2006/metadata/properties"/>
+    <ds:schemaRef ds:uri="http://www.w3.org/XML/1998/namespace"/>
+  </ds:schemaRefs>
+</ds:datastoreItem>
 </file>
</xml_diff>

<commit_message>
Updated reseach question, both hypothesis according to template
</commit_message>
<xml_diff>
--- a/Ds115 Team Research.pptx
+++ b/Ds115 Team Research.pptx
@@ -5016,23 +5016,10 @@
                     <a:lumMod val="75000"/>
                   </a:schemeClr>
                 </a:solidFill>
-                <a:latin typeface="Calibri"/>
                 <a:ea typeface="+mj-lt"/>
                 <a:cs typeface="+mj-lt"/>
               </a:rPr>
-              <a:t>t</a:t>
-            </a:r>
-            <a:r>
-              <a:rPr lang="en-US" sz="2400" b="0" dirty="0">
-                <a:solidFill>
-                  <a:schemeClr val="accent2">
-                    <a:lumMod val="75000"/>
-                  </a:schemeClr>
-                </a:solidFill>
-                <a:ea typeface="+mj-lt"/>
-                <a:cs typeface="+mj-lt"/>
-              </a:rPr>
-              <a:t>his dataset is interesting because it provides a clear view into India’s competitive aviation market, offering insights on pricing strategies, peak travel timings, and traveler preferences on high-demand routes. It’s valuable for both travelers looking to optimize costs and for businesses studying market behavior in one of the world’s largest aviation hubs. </a:t>
+              <a:t>it provides a clear view into India’s competitive aviation market, offering insights into pricing strategies, peak travel timings, and traveler preferences on high-demand routes.. </a:t>
             </a:r>
             <a:br>
               <a:rPr lang="en-US" sz="2200" b="0" dirty="0">
@@ -5158,7 +5145,7 @@
                 <a:latin typeface="Calibri"/>
                 <a:cs typeface="Calibri"/>
               </a:rPr>
-              <a:t>Price</a:t>
+              <a:t>Ticket Price</a:t>
             </a:r>
             <a:br>
               <a:rPr lang="en-US" sz="2400" b="0" dirty="0">
@@ -5381,7 +5368,7 @@
                 <a:ea typeface="Calibri" panose="020F0502020204030204" pitchFamily="34" charset="0"/>
                 <a:cs typeface="Times New Roman" panose="02020603050405020304" pitchFamily="18" charset="0"/>
               </a:rPr>
-              <a:t>Is there any</a:t>
+              <a:t>Is there a</a:t>
             </a:r>
             <a:r>
               <a:rPr lang="en-US" sz="3600" dirty="0"/>
@@ -5390,26 +5377,12 @@
             <a:r>
               <a:rPr lang="en-US" sz="3600" dirty="0">
                 <a:solidFill>
-                  <a:schemeClr val="accent2">
+                  <a:schemeClr val="accent4">
                     <a:lumMod val="75000"/>
                   </a:schemeClr>
                 </a:solidFill>
               </a:rPr>
-              <a:t>Flight duration </a:t>
-            </a:r>
-            <a:r>
-              <a:rPr lang="en-US" sz="3600" dirty="0"/>
-              <a:t>&amp; </a:t>
-            </a:r>
-            <a:r>
-              <a:rPr lang="en-US" sz="3600" dirty="0">
-                <a:solidFill>
-                  <a:schemeClr val="accent2">
-                    <a:lumMod val="75000"/>
-                  </a:schemeClr>
-                </a:solidFill>
-              </a:rPr>
-              <a:t>Ticket prices</a:t>
+              <a:t>Ticket price &amp; Flight duration</a:t>
             </a:r>
             <a:r>
               <a:rPr lang="en-US" sz="3600" dirty="0"/>
@@ -5591,35 +5564,76 @@
             <a:r>
               <a:rPr lang="en-US" sz="2400" b="0" spc="0" dirty="0">
                 <a:solidFill>
+                  <a:srgbClr val="FF0000"/>
+                </a:solidFill>
+                <a:latin typeface="+mn-lt"/>
+              </a:rPr>
+              <a:t>There is </a:t>
+            </a:r>
+            <a:r>
+              <a:rPr lang="en-US" sz="2400" spc="0" dirty="0">
+                <a:solidFill>
+                  <a:srgbClr val="FF0000"/>
+                </a:solidFill>
+                <a:latin typeface="+mn-lt"/>
+              </a:rPr>
+              <a:t>no </a:t>
+            </a:r>
+            <a:r>
+              <a:rPr lang="en-US" sz="2400" b="0" spc="0" dirty="0">
+                <a:solidFill>
+                  <a:srgbClr val="FF0000"/>
+                </a:solidFill>
+                <a:latin typeface="+mn-lt"/>
+              </a:rPr>
+              <a:t>correlation between </a:t>
+            </a:r>
+            <a:r>
+              <a:rPr lang="en-US" sz="2400" spc="0" dirty="0">
+                <a:solidFill>
+                  <a:srgbClr val="FF0000"/>
+                </a:solidFill>
+                <a:latin typeface="+mn-lt"/>
+              </a:rPr>
+              <a:t>flight duration</a:t>
+            </a:r>
+            <a:r>
+              <a:rPr lang="en-US" sz="2400" b="0" spc="0" dirty="0">
+                <a:solidFill>
+                  <a:srgbClr val="FF0000"/>
+                </a:solidFill>
+                <a:latin typeface="+mn-lt"/>
+              </a:rPr>
+              <a:t> and </a:t>
+            </a:r>
+            <a:r>
+              <a:rPr lang="en-US" sz="2400" spc="0" dirty="0">
+                <a:solidFill>
+                  <a:srgbClr val="FF0000"/>
+                </a:solidFill>
+                <a:latin typeface="+mn-lt"/>
+              </a:rPr>
+              <a:t>ticket prices</a:t>
+            </a:r>
+            <a:r>
+              <a:rPr lang="en-US" sz="2400" b="0" spc="0" dirty="0">
+                <a:solidFill>
+                  <a:srgbClr val="FF0000"/>
+                </a:solidFill>
+                <a:latin typeface="+mn-lt"/>
+              </a:rPr>
+              <a:t> for domestic flights departing from Delhi in India</a:t>
+            </a:r>
+            <a:r>
+              <a:rPr lang="en-US" sz="2400" b="0" spc="0" dirty="0">
+                <a:solidFill>
                   <a:schemeClr val="accent2">
                     <a:lumMod val="75000"/>
                   </a:schemeClr>
                 </a:solidFill>
                 <a:latin typeface="+mn-lt"/>
               </a:rPr>
-              <a:t>The null hypothesis states that there is </a:t>
-            </a:r>
-            <a:r>
-              <a:rPr lang="en-US" sz="2400" spc="0" dirty="0">
-                <a:solidFill>
-                  <a:schemeClr val="accent2">
-                    <a:lumMod val="75000"/>
-                  </a:schemeClr>
-                </a:solidFill>
-                <a:latin typeface="+mn-lt"/>
-              </a:rPr>
-              <a:t>no relationship</a:t>
-            </a:r>
-            <a:r>
-              <a:rPr lang="en-US" sz="2400" b="0" spc="0" dirty="0">
-                <a:solidFill>
-                  <a:schemeClr val="accent2">
-                    <a:lumMod val="75000"/>
-                  </a:schemeClr>
-                </a:solidFill>
-                <a:latin typeface="+mn-lt"/>
-              </a:rPr>
-              <a:t> between flight duration and ticket prices for domestic flights departing from Delhi in India.</a:t>
+              <a:t>.</a:t>
             </a:r>
             <a:br>
               <a:rPr lang="en-GB" sz="2400" b="0" spc="0" dirty="0">
@@ -5674,63 +5688,69 @@
             <a:r>
               <a:rPr lang="en-US" sz="2400" b="0" spc="0" dirty="0">
                 <a:solidFill>
-                  <a:schemeClr val="accent2">
-                    <a:lumMod val="75000"/>
-                  </a:schemeClr>
+                  <a:srgbClr val="FF0000"/>
                 </a:solidFill>
                 <a:latin typeface="+mn-lt"/>
               </a:rPr>
-              <a:t>The alternative hypothesis states that there is </a:t>
+              <a:t>There is </a:t>
             </a:r>
             <a:r>
               <a:rPr lang="en-US" sz="2400" spc="0" dirty="0">
                 <a:solidFill>
-                  <a:schemeClr val="accent2">
-                    <a:lumMod val="75000"/>
-                  </a:schemeClr>
+                  <a:srgbClr val="FF0000"/>
                 </a:solidFill>
                 <a:latin typeface="+mn-lt"/>
               </a:rPr>
-              <a:t>a relationship </a:t>
+              <a:t>a</a:t>
             </a:r>
             <a:r>
               <a:rPr lang="en-US" sz="2400" b="0" spc="0" dirty="0">
                 <a:solidFill>
-                  <a:schemeClr val="accent2">
-                    <a:lumMod val="75000"/>
-                  </a:schemeClr>
+                  <a:srgbClr val="FF0000"/>
                 </a:solidFill>
                 <a:latin typeface="+mn-lt"/>
               </a:rPr>
-              <a:t>between flight duration and ticket prices for domestic flights departing </a:t>
-            </a:r>
-            <a:r>
-              <a:rPr lang="en-US" sz="2400" b="0" spc="0">
-                <a:solidFill>
-                  <a:schemeClr val="accent2">
-                    <a:lumMod val="75000"/>
-                  </a:schemeClr>
+              <a:t> correlation between </a:t>
+            </a:r>
+            <a:r>
+              <a:rPr lang="en-US" sz="2400" spc="0" dirty="0">
+                <a:solidFill>
+                  <a:srgbClr val="FF0000"/>
                 </a:solidFill>
                 <a:latin typeface="+mn-lt"/>
               </a:rPr>
-              <a:t>from Delhi in </a:t>
+              <a:t>flight duration </a:t>
             </a:r>
             <a:r>
               <a:rPr lang="en-US" sz="2400" b="0" spc="0" dirty="0">
                 <a:solidFill>
-                  <a:schemeClr val="accent2">
-                    <a:lumMod val="75000"/>
-                  </a:schemeClr>
+                  <a:srgbClr val="FF0000"/>
                 </a:solidFill>
                 <a:latin typeface="+mn-lt"/>
               </a:rPr>
-              <a:t>India.</a:t>
+              <a:t>and </a:t>
+            </a:r>
+            <a:r>
+              <a:rPr lang="en-US" sz="2400" spc="0" dirty="0">
+                <a:solidFill>
+                  <a:srgbClr val="FF0000"/>
+                </a:solidFill>
+                <a:latin typeface="+mn-lt"/>
+              </a:rPr>
+              <a:t>ticket prices </a:t>
+            </a:r>
+            <a:r>
+              <a:rPr lang="en-US" sz="2400" b="0" spc="0" dirty="0">
+                <a:solidFill>
+                  <a:srgbClr val="FF0000"/>
+                </a:solidFill>
+                <a:latin typeface="+mn-lt"/>
+              </a:rPr>
+              <a:t>for domestic flights departing from Delhi in India.</a:t>
             </a:r>
             <a:endParaRPr lang="en-US" sz="2400" b="0" spc="0" dirty="0">
               <a:solidFill>
-                <a:schemeClr val="accent2">
-                  <a:lumMod val="75000"/>
-                </a:schemeClr>
+                <a:srgbClr val="FF0000"/>
               </a:solidFill>
               <a:cs typeface="Arial"/>
             </a:endParaRPr>
@@ -6947,20 +6967,20 @@
 </file>
 
 <file path=customXml/item2.xml><?xml version="1.0" encoding="utf-8"?>
+<p:properties xmlns:p="http://schemas.microsoft.com/office/2006/metadata/properties" xmlns:xsi="http://www.w3.org/2001/XMLSchema-instance" xmlns:pc="http://schemas.microsoft.com/office/infopath/2007/PartnerControls">
+  <documentManagement>
+    <_activity xmlns="e0b66e2b-8ac0-4af7-b642-ec91160566fb" xsi:nil="true"/>
+  </documentManagement>
+</p:properties>
+</file>
+
+<file path=customXml/item3.xml><?xml version="1.0" encoding="utf-8"?>
 <?mso-contentType ?>
 <FormTemplates xmlns="http://schemas.microsoft.com/sharepoint/v3/contenttype/forms">
   <Display>DocumentLibraryForm</Display>
   <Edit>DocumentLibraryForm</Edit>
   <New>DocumentLibraryForm</New>
 </FormTemplates>
-</file>
-
-<file path=customXml/item3.xml><?xml version="1.0" encoding="utf-8"?>
-<p:properties xmlns:p="http://schemas.microsoft.com/office/2006/metadata/properties" xmlns:xsi="http://www.w3.org/2001/XMLSchema-instance" xmlns:pc="http://schemas.microsoft.com/office/infopath/2007/PartnerControls">
-  <documentManagement>
-    <_activity xmlns="e0b66e2b-8ac0-4af7-b642-ec91160566fb" xsi:nil="true"/>
-  </documentManagement>
-</p:properties>
 </file>
 
 <file path=customXml/itemProps1.xml><?xml version="1.0" encoding="utf-8"?>
@@ -6982,14 +7002,6 @@
 </file>
 
 <file path=customXml/itemProps2.xml><?xml version="1.0" encoding="utf-8"?>
-<ds:datastoreItem xmlns:ds="http://schemas.openxmlformats.org/officeDocument/2006/customXml" ds:itemID="{91C521DD-2673-4EE6-BB9B-DC5C3320FFBB}">
-  <ds:schemaRefs>
-    <ds:schemaRef ds:uri="http://schemas.microsoft.com/sharepoint/v3/contenttype/forms"/>
-  </ds:schemaRefs>
-</ds:datastoreItem>
-</file>
-
-<file path=customXml/itemProps3.xml><?xml version="1.0" encoding="utf-8"?>
 <ds:datastoreItem xmlns:ds="http://schemas.openxmlformats.org/officeDocument/2006/customXml" ds:itemID="{EDD1FC41-23C7-41B0-B5F9-BF4CD38AD2ED}">
   <ds:schemaRefs>
     <ds:schemaRef ds:uri="http://schemas.microsoft.com/office/infopath/2007/PartnerControls"/>
@@ -7003,4 +7015,12 @@
     <ds:schemaRef ds:uri="http://www.w3.org/XML/1998/namespace"/>
   </ds:schemaRefs>
 </ds:datastoreItem>
+</file>
+
+<file path=customXml/itemProps3.xml><?xml version="1.0" encoding="utf-8"?>
+<ds:datastoreItem xmlns:ds="http://schemas.openxmlformats.org/officeDocument/2006/customXml" ds:itemID="{91C521DD-2673-4EE6-BB9B-DC5C3320FFBB}">
+  <ds:schemaRefs>
+    <ds:schemaRef ds:uri="http://schemas.microsoft.com/sharepoint/v3/contenttype/forms"/>
+  </ds:schemaRefs>
+</ds:datastoreItem>
 </file>
</xml_diff>

<commit_message>
updated ppt with new combined dataset snipet
</commit_message>
<xml_diff>
--- a/Ds115 Team Research.pptx
+++ b/Ds115 Team Research.pptx
@@ -12,10 +12,10 @@
   </p:handoutMasterIdLst>
   <p:sldIdLst>
     <p:sldId id="289" r:id="rId5"/>
-    <p:sldId id="329" r:id="rId6"/>
-    <p:sldId id="336" r:id="rId7"/>
-    <p:sldId id="338" r:id="rId8"/>
-    <p:sldId id="339" r:id="rId9"/>
+    <p:sldId id="339" r:id="rId6"/>
+    <p:sldId id="329" r:id="rId7"/>
+    <p:sldId id="336" r:id="rId8"/>
+    <p:sldId id="338" r:id="rId9"/>
     <p:sldId id="340" r:id="rId10"/>
   </p:sldIdLst>
   <p:sldSz cx="12192000" cy="6858000"/>
@@ -761,7 +761,7 @@
             <a:fld id="{30370952-48CC-46D7-9FCD-59FAD40CC025}" type="slidenum">
               <a:rPr lang="en-GB" smtClean="0"/>
               <a:pPr/>
-              <a:t>2</a:t>
+              <a:t>3</a:t>
             </a:fld>
             <a:endParaRPr lang="en-GB"/>
           </a:p>
@@ -846,7 +846,7 @@
             <a:fld id="{30370952-48CC-46D7-9FCD-59FAD40CC025}" type="slidenum">
               <a:rPr lang="en-GB" smtClean="0"/>
               <a:pPr/>
-              <a:t>3</a:t>
+              <a:t>4</a:t>
             </a:fld>
             <a:endParaRPr lang="en-GB"/>
           </a:p>
@@ -4840,157 +4840,84 @@
       </p:grpSpPr>
       <p:sp>
         <p:nvSpPr>
-          <p:cNvPr id="2" name="Subtitle 1">
-            <a:extLst>
-              <a:ext uri="{FF2B5EF4-FFF2-40B4-BE49-F238E27FC236}">
-                <a16:creationId xmlns:a16="http://schemas.microsoft.com/office/drawing/2014/main" id="{7D9D8228-727F-1E46-B5AD-91D158B8255E}"/>
-              </a:ext>
-            </a:extLst>
-          </p:cNvPr>
-          <p:cNvSpPr>
-            <a:spLocks noGrp="1"/>
-          </p:cNvSpPr>
-          <p:nvPr>
-            <p:ph type="subTitle" idx="1"/>
+          <p:cNvPr id="3" name="Footer Placeholder 2">
+            <a:extLst>
+              <a:ext uri="{FF2B5EF4-FFF2-40B4-BE49-F238E27FC236}">
+                <a16:creationId xmlns:a16="http://schemas.microsoft.com/office/drawing/2014/main" id="{1E32129C-44C2-95DE-7FB4-8025AAB3EA1F}"/>
+              </a:ext>
+            </a:extLst>
+          </p:cNvPr>
+          <p:cNvSpPr>
+            <a:spLocks noGrp="1"/>
+          </p:cNvSpPr>
+          <p:nvPr>
+            <p:ph type="ftr" sz="quarter" idx="11"/>
+          </p:nvPr>
+        </p:nvSpPr>
+        <p:spPr/>
+        <p:txBody>
+          <a:bodyPr/>
+          <a:lstStyle/>
+          <a:p>
+            <a:r>
+              <a:rPr lang="en-US"/>
+              <a:t>Airline ticket prices in India</a:t>
+            </a:r>
+            <a:endParaRPr lang="en-GB"/>
+          </a:p>
+        </p:txBody>
+      </p:sp>
+      <p:sp>
+        <p:nvSpPr>
+          <p:cNvPr id="4" name="Slide Number Placeholder 3">
+            <a:extLst>
+              <a:ext uri="{FF2B5EF4-FFF2-40B4-BE49-F238E27FC236}">
+                <a16:creationId xmlns:a16="http://schemas.microsoft.com/office/drawing/2014/main" id="{9143F542-9925-BCBE-2DA4-35A32A38D9AD}"/>
+              </a:ext>
+            </a:extLst>
+          </p:cNvPr>
+          <p:cNvSpPr>
+            <a:spLocks noGrp="1"/>
+          </p:cNvSpPr>
+          <p:nvPr>
+            <p:ph type="sldNum" sz="quarter" idx="12"/>
+          </p:nvPr>
+        </p:nvSpPr>
+        <p:spPr/>
+        <p:txBody>
+          <a:bodyPr/>
+          <a:lstStyle/>
+          <a:p>
+            <a:fld id="{E4D355CA-84B7-41B1-B164-8BB439CC7C6B}" type="slidenum">
+              <a:rPr lang="en-GB" smtClean="0"/>
+              <a:pPr/>
+              <a:t>2</a:t>
+            </a:fld>
+            <a:endParaRPr lang="en-GB"/>
+          </a:p>
+        </p:txBody>
+      </p:sp>
+      <p:sp>
+        <p:nvSpPr>
+          <p:cNvPr id="5" name="Title 4">
+            <a:extLst>
+              <a:ext uri="{FF2B5EF4-FFF2-40B4-BE49-F238E27FC236}">
+                <a16:creationId xmlns:a16="http://schemas.microsoft.com/office/drawing/2014/main" id="{FEF2E89F-D251-B0A8-2377-FD314948D49C}"/>
+              </a:ext>
+            </a:extLst>
+          </p:cNvPr>
+          <p:cNvSpPr>
+            <a:spLocks noGrp="1"/>
+          </p:cNvSpPr>
+          <p:nvPr>
+            <p:ph type="ctrTitle"/>
           </p:nvPr>
         </p:nvSpPr>
         <p:spPr>
           <a:xfrm>
-            <a:off x="965288" y="1066067"/>
-            <a:ext cx="10110240" cy="588024"/>
+            <a:off x="952800" y="697001"/>
+            <a:ext cx="10031157" cy="649705"/>
           </a:xfrm>
-        </p:spPr>
-        <p:txBody>
-          <a:bodyPr vert="horz" lIns="0" tIns="0" rIns="0" bIns="0" rtlCol="0" anchor="t">
-            <a:noAutofit/>
-          </a:bodyPr>
-          <a:lstStyle/>
-          <a:p>
-            <a:r>
-              <a:rPr lang="en-US" sz="2800"/>
-              <a:t>Dataset </a:t>
-            </a:r>
-            <a:r>
-              <a:rPr lang="en-US" sz="2800">
-                <a:solidFill>
-                  <a:srgbClr val="203232"/>
-                </a:solidFill>
-              </a:rPr>
-              <a:t>ID</a:t>
-            </a:r>
-            <a:r>
-              <a:rPr lang="en-US" sz="1600">
-                <a:solidFill>
-                  <a:srgbClr val="FF0000"/>
-                </a:solidFill>
-              </a:rPr>
-              <a:t>:   </a:t>
-            </a:r>
-            <a:r>
-              <a:rPr lang="en-US" sz="2400">
-                <a:solidFill>
-                  <a:srgbClr val="FF0000"/>
-                </a:solidFill>
-              </a:rPr>
-              <a:t>DS115 </a:t>
-            </a:r>
-          </a:p>
-        </p:txBody>
-      </p:sp>
-      <p:sp>
-        <p:nvSpPr>
-          <p:cNvPr id="3" name="Footer Placeholder 2">
-            <a:extLst>
-              <a:ext uri="{FF2B5EF4-FFF2-40B4-BE49-F238E27FC236}">
-                <a16:creationId xmlns:a16="http://schemas.microsoft.com/office/drawing/2014/main" id="{00EBC183-8AA5-EC44-9987-D65F5C1892A1}"/>
-              </a:ext>
-            </a:extLst>
-          </p:cNvPr>
-          <p:cNvSpPr>
-            <a:spLocks noGrp="1"/>
-          </p:cNvSpPr>
-          <p:nvPr>
-            <p:ph type="ftr" sz="quarter" idx="11"/>
-          </p:nvPr>
-        </p:nvSpPr>
-        <p:spPr>
-          <a:xfrm>
-            <a:off x="965288" y="791022"/>
-            <a:ext cx="9129687" cy="230832"/>
-          </a:xfrm>
-        </p:spPr>
-        <p:txBody>
-          <a:bodyPr/>
-          <a:lstStyle/>
-          <a:p>
-            <a:r>
-              <a:rPr lang="en-US"/>
-              <a:t>Airline ticket prices in India</a:t>
-            </a:r>
-            <a:endParaRPr lang="en-GB"/>
-          </a:p>
-        </p:txBody>
-      </p:sp>
-      <p:sp>
-        <p:nvSpPr>
-          <p:cNvPr id="4" name="Slide Number Placeholder 3">
-            <a:extLst>
-              <a:ext uri="{FF2B5EF4-FFF2-40B4-BE49-F238E27FC236}">
-                <a16:creationId xmlns:a16="http://schemas.microsoft.com/office/drawing/2014/main" id="{CC9D9611-42EE-7840-81EE-DD6B1A99CD7B}"/>
-              </a:ext>
-            </a:extLst>
-          </p:cNvPr>
-          <p:cNvSpPr>
-            <a:spLocks noGrp="1"/>
-          </p:cNvSpPr>
-          <p:nvPr>
-            <p:ph type="sldNum" sz="quarter" idx="12"/>
-          </p:nvPr>
-        </p:nvSpPr>
-        <p:spPr>
-          <a:xfrm>
-            <a:off x="10954512" y="555565"/>
-            <a:ext cx="622800" cy="230832"/>
-          </a:xfrm>
-        </p:spPr>
-        <p:txBody>
-          <a:bodyPr/>
-          <a:lstStyle/>
-          <a:p>
-            <a:r>
-              <a:rPr lang="en-US"/>
-              <a:t>2</a:t>
-            </a:r>
-            <a:endParaRPr lang="en-GB"/>
-          </a:p>
-        </p:txBody>
-      </p:sp>
-      <p:sp>
-        <p:nvSpPr>
-          <p:cNvPr id="5" name="Title 4">
-            <a:extLst>
-              <a:ext uri="{FF2B5EF4-FFF2-40B4-BE49-F238E27FC236}">
-                <a16:creationId xmlns:a16="http://schemas.microsoft.com/office/drawing/2014/main" id="{B3FA3829-F12C-214D-8FBA-7E1A740F65CA}"/>
-              </a:ext>
-            </a:extLst>
-          </p:cNvPr>
-          <p:cNvSpPr>
-            <a:spLocks noGrp="1"/>
-          </p:cNvSpPr>
-          <p:nvPr>
-            <p:ph type="ctrTitle"/>
-          </p:nvPr>
-        </p:nvSpPr>
-        <p:spPr>
-          <a:xfrm>
-            <a:off x="965288" y="1457674"/>
-            <a:ext cx="10837691" cy="3687511"/>
-          </a:xfrm>
-          <a:ln>
-            <a:solidFill>
-              <a:schemeClr val="bg1"/>
-            </a:solidFill>
-          </a:ln>
         </p:spPr>
         <p:txBody>
           <a:bodyPr>
@@ -4998,198 +4925,90 @@
           </a:bodyPr>
           <a:lstStyle/>
           <a:p>
-            <a:pPr>
-              <a:lnSpc>
-                <a:spcPct val="100000"/>
-              </a:lnSpc>
-            </a:pPr>
-            <a:r>
-              <a:rPr lang="en-US" sz="2400" b="0" dirty="0">
-                <a:latin typeface="Calibri"/>
-                <a:cs typeface="Calibri"/>
-              </a:rPr>
-              <a:t>This dataset is interesting to us because </a:t>
-            </a:r>
-            <a:r>
-              <a:rPr lang="en-US" sz="2400" b="0" dirty="0">
-                <a:solidFill>
-                  <a:schemeClr val="accent2">
-                    <a:lumMod val="75000"/>
-                  </a:schemeClr>
-                </a:solidFill>
-                <a:ea typeface="+mj-lt"/>
-                <a:cs typeface="+mj-lt"/>
-              </a:rPr>
-              <a:t>it provides a clear view into India’s competitive aviation market, offering insights into pricing strategies, peak travel timings, and traveler preferences on high-demand routes.. </a:t>
-            </a:r>
-            <a:br>
-              <a:rPr lang="en-US" sz="2200" b="0" dirty="0">
-                <a:ea typeface="+mj-lt"/>
-                <a:cs typeface="+mj-lt"/>
-              </a:rPr>
-            </a:br>
-            <a:br>
-              <a:rPr lang="en-US" sz="2400" b="0" dirty="0">
-                <a:latin typeface="Calibri"/>
-                <a:cs typeface="Calibri" panose="020F0502020204030204" pitchFamily="34" charset="0"/>
-              </a:rPr>
-            </a:br>
-            <a:r>
-              <a:rPr lang="en-US" sz="2400" b="0" dirty="0">
-                <a:latin typeface="Calibri"/>
-                <a:cs typeface="Calibri"/>
-              </a:rPr>
-              <a:t>Our  Independent variable is</a:t>
-            </a:r>
-            <a:r>
-              <a:rPr lang="en-US" sz="2400" b="0">
-                <a:latin typeface="Calibri"/>
-                <a:cs typeface="Calibri"/>
-              </a:rPr>
-              <a:t>: </a:t>
-            </a:r>
-            <a:r>
-              <a:rPr lang="en-US" sz="2400" b="0">
-                <a:solidFill>
-                  <a:schemeClr val="accent2">
-                    <a:lumMod val="76000"/>
-                  </a:schemeClr>
-                </a:solidFill>
-                <a:latin typeface="Calibri"/>
-                <a:cs typeface="Calibri"/>
-              </a:rPr>
-              <a:t>Duration</a:t>
-            </a:r>
-            <a:br>
-              <a:rPr lang="en-US" sz="2400" dirty="0">
-                <a:latin typeface="Calibri"/>
-                <a:cs typeface="Calibri"/>
-              </a:rPr>
-            </a:br>
-            <a:r>
-              <a:rPr lang="en-US" sz="2400" b="0" dirty="0">
-                <a:solidFill>
-                  <a:srgbClr val="FF0000"/>
-                </a:solidFill>
-                <a:latin typeface="Calibri"/>
-                <a:cs typeface="Calibri"/>
-              </a:rPr>
-              <a:t>                   </a:t>
-            </a:r>
-            <a:r>
-              <a:rPr lang="en-US" sz="2400" b="0" dirty="0">
-                <a:latin typeface="Calibri"/>
-                <a:cs typeface="Calibri"/>
-              </a:rPr>
-              <a:t>This  Independent variable datatype is : </a:t>
-            </a:r>
-            <a:r>
-              <a:rPr lang="en-US" sz="2400" b="0" dirty="0">
-                <a:solidFill>
-                  <a:srgbClr val="FF0000"/>
-                </a:solidFill>
-                <a:latin typeface="Calibri"/>
-                <a:cs typeface="Calibri"/>
-              </a:rPr>
-              <a:t>Continuous</a:t>
-            </a:r>
-            <a:br>
-              <a:rPr lang="en-US" sz="2400" b="0" dirty="0">
-                <a:solidFill>
-                  <a:srgbClr val="203232"/>
-                </a:solidFill>
-                <a:latin typeface="Calibri"/>
-                <a:cs typeface="Calibri"/>
-              </a:rPr>
-            </a:br>
-            <a:r>
-              <a:rPr lang="en-US" sz="2400" b="0" dirty="0">
-                <a:solidFill>
-                  <a:srgbClr val="203232"/>
-                </a:solidFill>
-                <a:latin typeface="Calibri"/>
-                <a:cs typeface="Calibri"/>
-              </a:rPr>
-              <a:t>Our</a:t>
-            </a:r>
-            <a:r>
-              <a:rPr lang="en-US" sz="2400" b="0" dirty="0">
-                <a:latin typeface="Calibri"/>
-                <a:cs typeface="Calibri"/>
-              </a:rPr>
-              <a:t> Dependent variable is</a:t>
-            </a:r>
-            <a:r>
-              <a:rPr lang="en-US" sz="2400" b="0">
-                <a:latin typeface="Calibri"/>
-                <a:cs typeface="Calibri"/>
-              </a:rPr>
-              <a:t>: </a:t>
-            </a:r>
-            <a:r>
-              <a:rPr lang="en-US" sz="2400" b="0">
-                <a:solidFill>
-                  <a:schemeClr val="accent2">
-                    <a:lumMod val="76000"/>
-                  </a:schemeClr>
-                </a:solidFill>
-                <a:latin typeface="Calibri"/>
-                <a:cs typeface="Calibri"/>
-              </a:rPr>
-              <a:t> </a:t>
-            </a:r>
-            <a:r>
-              <a:rPr lang="en-US" sz="2400" b="0" dirty="0">
-                <a:solidFill>
-                  <a:schemeClr val="accent2">
-                    <a:lumMod val="76000"/>
-                  </a:schemeClr>
-                </a:solidFill>
-                <a:latin typeface="Calibri"/>
-                <a:cs typeface="Calibri"/>
-              </a:rPr>
-              <a:t>Price</a:t>
-            </a:r>
-            <a:br>
-              <a:rPr lang="en-US" sz="2400" b="0" dirty="0">
-                <a:latin typeface="Calibri"/>
-                <a:cs typeface="Calibri"/>
-              </a:rPr>
-            </a:br>
-            <a:r>
-              <a:rPr lang="en-US" sz="2400" b="0" dirty="0">
-                <a:solidFill>
-                  <a:srgbClr val="FF0000"/>
-                </a:solidFill>
-                <a:latin typeface="Calibri"/>
-                <a:cs typeface="Calibri"/>
-              </a:rPr>
-              <a:t>                   </a:t>
-            </a:r>
-            <a:r>
-              <a:rPr lang="en-US" sz="2400" b="0" dirty="0">
-                <a:latin typeface="Calibri"/>
-                <a:cs typeface="Calibri"/>
-              </a:rPr>
-              <a:t>This Dependent variable datatype is : </a:t>
-            </a:r>
-            <a:r>
-              <a:rPr lang="en-US" sz="2400" b="0" dirty="0">
-                <a:solidFill>
-                  <a:srgbClr val="FF0000"/>
-                </a:solidFill>
-                <a:latin typeface="Calibri"/>
-                <a:cs typeface="Calibri"/>
-              </a:rPr>
-              <a:t>Continuous </a:t>
-            </a:r>
+            <a:r>
+              <a:rPr lang="en-US" sz="4000"/>
+              <a:t>Dataset – Airline ticket price in India DS-115</a:t>
+            </a:r>
+            <a:endParaRPr lang="en-GB" sz="4000"/>
+          </a:p>
+        </p:txBody>
+      </p:sp>
+      <p:pic>
+        <p:nvPicPr>
+          <p:cNvPr id="6" name="Picture 5" descr="A screen shot of a flight schedule&#10;&#10;Description automatically generated">
+            <a:extLst>
+              <a:ext uri="{FF2B5EF4-FFF2-40B4-BE49-F238E27FC236}">
+                <a16:creationId xmlns:a16="http://schemas.microsoft.com/office/drawing/2014/main" id="{01E913B9-78DD-2B07-60AC-6F6FDDC6BAAD}"/>
+              </a:ext>
+            </a:extLst>
+          </p:cNvPr>
+          <p:cNvPicPr>
+            <a:picLocks noChangeAspect="1"/>
+          </p:cNvPicPr>
+          <p:nvPr/>
+        </p:nvPicPr>
+        <p:blipFill>
+          <a:blip r:embed="rId2">
+            <a:extLst>
+              <a:ext uri="{28A0092B-C50C-407E-A947-70E740481C1C}">
+                <a14:useLocalDpi xmlns:a14="http://schemas.microsoft.com/office/drawing/2010/main" val="0"/>
+              </a:ext>
+            </a:extLst>
+          </a:blip>
+          <a:stretch>
+            <a:fillRect/>
+          </a:stretch>
+        </p:blipFill>
+        <p:spPr>
+          <a:xfrm>
+            <a:off x="952801" y="1620253"/>
+            <a:ext cx="9378316" cy="3192379"/>
+          </a:xfrm>
+          <a:prstGeom prst="rect">
+            <a:avLst/>
+          </a:prstGeom>
+        </p:spPr>
+      </p:pic>
+      <p:sp>
+        <p:nvSpPr>
+          <p:cNvPr id="8" name="TextBox 7">
+            <a:extLst>
+              <a:ext uri="{FF2B5EF4-FFF2-40B4-BE49-F238E27FC236}">
+                <a16:creationId xmlns:a16="http://schemas.microsoft.com/office/drawing/2014/main" id="{6C7486C2-9C38-358A-34E1-40BF4ACC4F4A}"/>
+              </a:ext>
+            </a:extLst>
+          </p:cNvPr>
+          <p:cNvSpPr txBox="1"/>
+          <p:nvPr/>
+        </p:nvSpPr>
+        <p:spPr>
+          <a:xfrm>
+            <a:off x="952800" y="4961467"/>
+            <a:ext cx="6383866" cy="369332"/>
+          </a:xfrm>
+          <a:prstGeom prst="rect">
+            <a:avLst/>
+          </a:prstGeom>
+          <a:noFill/>
+        </p:spPr>
+        <p:txBody>
+          <a:bodyPr wrap="square" rtlCol="0">
+            <a:spAutoFit/>
+          </a:bodyPr>
+          <a:lstStyle/>
+          <a:p>
+            <a:r>
+              <a:rPr lang="en-US" dirty="0"/>
+              <a:t>Our dataset flight_data.csv has 404 rows</a:t>
+            </a:r>
+            <a:endParaRPr lang="en-GB" dirty="0"/>
           </a:p>
         </p:txBody>
       </p:sp>
     </p:spTree>
     <p:extLst>
       <p:ext uri="{BB962C8B-B14F-4D97-AF65-F5344CB8AC3E}">
-        <p14:creationId xmlns:p14="http://schemas.microsoft.com/office/powerpoint/2010/main" val="1718004908"/>
+        <p14:creationId xmlns:p14="http://schemas.microsoft.com/office/powerpoint/2010/main" val="271734506"/>
       </p:ext>
     </p:extLst>
   </p:cSld>
@@ -5221,7 +5040,7 @@
           <p:cNvPr id="2" name="Subtitle 1">
             <a:extLst>
               <a:ext uri="{FF2B5EF4-FFF2-40B4-BE49-F238E27FC236}">
-                <a16:creationId xmlns:a16="http://schemas.microsoft.com/office/drawing/2014/main" id="{8E3CD731-5ACF-B002-247D-243F6E2149EC}"/>
+                <a16:creationId xmlns:a16="http://schemas.microsoft.com/office/drawing/2014/main" id="{7D9D8228-727F-1E46-B5AD-91D158B8255E}"/>
               </a:ext>
             </a:extLst>
           </p:cNvPr>
@@ -5234,52 +5053,73 @@
         </p:nvSpPr>
         <p:spPr>
           <a:xfrm>
-            <a:off x="965289" y="1147638"/>
-            <a:ext cx="9753625" cy="230832"/>
+            <a:off x="965288" y="1066067"/>
+            <a:ext cx="10110240" cy="588024"/>
           </a:xfrm>
         </p:spPr>
         <p:txBody>
+          <a:bodyPr vert="horz" lIns="0" tIns="0" rIns="0" bIns="0" rtlCol="0" anchor="t">
+            <a:noAutofit/>
+          </a:bodyPr>
+          <a:lstStyle/>
+          <a:p>
+            <a:r>
+              <a:rPr lang="en-US" sz="2800"/>
+              <a:t>Dataset </a:t>
+            </a:r>
+            <a:r>
+              <a:rPr lang="en-US" sz="2800">
+                <a:solidFill>
+                  <a:srgbClr val="203232"/>
+                </a:solidFill>
+              </a:rPr>
+              <a:t>ID</a:t>
+            </a:r>
+            <a:r>
+              <a:rPr lang="en-US" sz="1600">
+                <a:solidFill>
+                  <a:srgbClr val="FF0000"/>
+                </a:solidFill>
+              </a:rPr>
+              <a:t>:   </a:t>
+            </a:r>
+            <a:r>
+              <a:rPr lang="en-US" sz="2400">
+                <a:solidFill>
+                  <a:srgbClr val="FF0000"/>
+                </a:solidFill>
+              </a:rPr>
+              <a:t>DS115 </a:t>
+            </a:r>
+          </a:p>
+        </p:txBody>
+      </p:sp>
+      <p:sp>
+        <p:nvSpPr>
+          <p:cNvPr id="3" name="Footer Placeholder 2">
+            <a:extLst>
+              <a:ext uri="{FF2B5EF4-FFF2-40B4-BE49-F238E27FC236}">
+                <a16:creationId xmlns:a16="http://schemas.microsoft.com/office/drawing/2014/main" id="{00EBC183-8AA5-EC44-9987-D65F5C1892A1}"/>
+              </a:ext>
+            </a:extLst>
+          </p:cNvPr>
+          <p:cNvSpPr>
+            <a:spLocks noGrp="1"/>
+          </p:cNvSpPr>
+          <p:nvPr>
+            <p:ph type="ftr" sz="quarter" idx="11"/>
+          </p:nvPr>
+        </p:nvSpPr>
+        <p:spPr>
+          <a:xfrm>
+            <a:off x="965288" y="791022"/>
+            <a:ext cx="9129687" cy="230832"/>
+          </a:xfrm>
+        </p:spPr>
+        <p:txBody>
           <a:bodyPr/>
           <a:lstStyle/>
           <a:p>
-            <a:pPr>
-              <a:spcAft>
-                <a:spcPts val="0"/>
-              </a:spcAft>
-            </a:pPr>
-            <a:r>
-              <a:rPr lang="en-GB"/>
-              <a:t>Our Research Question is:</a:t>
-            </a:r>
-            <a:endParaRPr lang="en-GB" sz="1800">
-              <a:solidFill>
-                <a:srgbClr val="FF0000"/>
-              </a:solidFill>
-            </a:endParaRPr>
-          </a:p>
-        </p:txBody>
-      </p:sp>
-      <p:sp>
-        <p:nvSpPr>
-          <p:cNvPr id="3" name="Footer Placeholder 2">
-            <a:extLst>
-              <a:ext uri="{FF2B5EF4-FFF2-40B4-BE49-F238E27FC236}">
-                <a16:creationId xmlns:a16="http://schemas.microsoft.com/office/drawing/2014/main" id="{3C4D431B-7665-75B0-2D73-5BD588DCB766}"/>
-              </a:ext>
-            </a:extLst>
-          </p:cNvPr>
-          <p:cNvSpPr>
-            <a:spLocks noGrp="1"/>
-          </p:cNvSpPr>
-          <p:nvPr>
-            <p:ph type="ftr" sz="quarter" idx="11"/>
-          </p:nvPr>
-        </p:nvSpPr>
-        <p:spPr/>
-        <p:txBody>
-          <a:bodyPr/>
-          <a:lstStyle/>
-          <a:p>
             <a:r>
               <a:rPr lang="en-US"/>
               <a:t>Airline ticket prices in India</a:t>
@@ -5293,7 +5133,7 @@
           <p:cNvPr id="4" name="Slide Number Placeholder 3">
             <a:extLst>
               <a:ext uri="{FF2B5EF4-FFF2-40B4-BE49-F238E27FC236}">
-                <a16:creationId xmlns:a16="http://schemas.microsoft.com/office/drawing/2014/main" id="{1625FA15-B17F-387B-E383-5505647ABB89}"/>
+                <a16:creationId xmlns:a16="http://schemas.microsoft.com/office/drawing/2014/main" id="{CC9D9611-42EE-7840-81EE-DD6B1A99CD7B}"/>
               </a:ext>
             </a:extLst>
           </p:cNvPr>
@@ -5306,7 +5146,7 @@
         </p:nvSpPr>
         <p:spPr>
           <a:xfrm>
-            <a:off x="10616400" y="791022"/>
+            <a:off x="10954512" y="555565"/>
             <a:ext cx="622800" cy="230832"/>
           </a:xfrm>
         </p:spPr>
@@ -5316,7 +5156,7 @@
           <a:p>
             <a:r>
               <a:rPr lang="en-US"/>
-              <a:t>3</a:t>
+              <a:t>2</a:t>
             </a:r>
             <a:endParaRPr lang="en-GB"/>
           </a:p>
@@ -5327,7 +5167,7 @@
           <p:cNvPr id="5" name="Title 4">
             <a:extLst>
               <a:ext uri="{FF2B5EF4-FFF2-40B4-BE49-F238E27FC236}">
-                <a16:creationId xmlns:a16="http://schemas.microsoft.com/office/drawing/2014/main" id="{3440DA25-F620-152B-DE9E-776F7B74DFF0}"/>
+                <a16:creationId xmlns:a16="http://schemas.microsoft.com/office/drawing/2014/main" id="{B3FA3829-F12C-214D-8FBA-7E1A740F65CA}"/>
               </a:ext>
             </a:extLst>
           </p:cNvPr>
@@ -5340,9 +5180,14 @@
         </p:nvSpPr>
         <p:spPr>
           <a:xfrm>
-            <a:off x="965289" y="1659468"/>
-            <a:ext cx="10640594" cy="2912532"/>
+            <a:off x="965288" y="1457674"/>
+            <a:ext cx="10837691" cy="3687511"/>
           </a:xfrm>
+          <a:ln>
+            <a:solidFill>
+              <a:schemeClr val="bg1"/>
+            </a:solidFill>
+          </a:ln>
         </p:spPr>
         <p:txBody>
           <a:bodyPr>
@@ -5355,77 +5200,193 @@
                 <a:spcPct val="100000"/>
               </a:lnSpc>
             </a:pPr>
-            <a:br>
-              <a:rPr lang="en-GB" sz="3600" dirty="0">
-                <a:latin typeface="Calibri" panose="020F0502020204030204" pitchFamily="34" charset="0"/>
-                <a:ea typeface="Calibri" panose="020F0502020204030204" pitchFamily="34" charset="0"/>
-                <a:cs typeface="Times New Roman" panose="02020603050405020304" pitchFamily="18" charset="0"/>
+            <a:r>
+              <a:rPr lang="en-US" sz="2400" b="0" dirty="0">
+                <a:latin typeface="Calibri"/>
+                <a:cs typeface="Calibri"/>
               </a:rPr>
-            </a:br>
-            <a:br>
-              <a:rPr lang="en-US" sz="3600" dirty="0"/>
-            </a:br>
-            <a:r>
-              <a:rPr lang="en-GB" sz="3600" dirty="0">
-                <a:latin typeface="Calibri" panose="020F0502020204030204" pitchFamily="34" charset="0"/>
-                <a:ea typeface="Calibri" panose="020F0502020204030204" pitchFamily="34" charset="0"/>
-                <a:cs typeface="Times New Roman" panose="02020603050405020304" pitchFamily="18" charset="0"/>
-              </a:rPr>
-              <a:t>Is there a</a:t>
-            </a:r>
-            <a:r>
-              <a:rPr lang="en-US" sz="3600" dirty="0"/>
-              <a:t> correlation between </a:t>
-            </a:r>
-            <a:r>
-              <a:rPr lang="en-US" sz="3600" dirty="0">
-                <a:solidFill>
-                  <a:schemeClr val="accent4">
-                    <a:lumMod val="75000"/>
-                  </a:schemeClr>
-                </a:solidFill>
-              </a:rPr>
-              <a:t>Ticket price &amp; Flight duration</a:t>
-            </a:r>
-            <a:r>
-              <a:rPr lang="en-US" sz="3600" dirty="0"/>
-              <a:t> for </a:t>
-            </a:r>
-            <a:r>
-              <a:rPr lang="en-US" sz="3600" dirty="0">
+              <a:t>This dataset is interesting to us because </a:t>
+            </a:r>
+            <a:r>
+              <a:rPr lang="en-US" sz="2400" b="0" dirty="0">
                 <a:solidFill>
                   <a:schemeClr val="accent2">
                     <a:lumMod val="75000"/>
                   </a:schemeClr>
                 </a:solidFill>
+                <a:ea typeface="+mj-lt"/>
+                <a:cs typeface="+mj-lt"/>
               </a:rPr>
-              <a:t>domestic flights </a:t>
-            </a:r>
-            <a:r>
-              <a:rPr lang="en-US" sz="3600" dirty="0"/>
-              <a:t>in India?.</a:t>
+              <a:t>it provides a clear view into India’s competitive aviation market, offering insights into pricing strategies, peak travel timings, and traveler preferences on high-demand routes.. </a:t>
             </a:r>
             <a:br>
-              <a:rPr lang="en-US" sz="3600" dirty="0"/>
+              <a:rPr lang="en-US" sz="2200" b="0" dirty="0">
+                <a:ea typeface="+mj-lt"/>
+                <a:cs typeface="+mj-lt"/>
+              </a:rPr>
             </a:br>
             <a:br>
-              <a:rPr lang="en-US" sz="3600" dirty="0"/>
+              <a:rPr lang="en-US" sz="2400" b="0" dirty="0">
+                <a:latin typeface="Calibri"/>
+                <a:cs typeface="Calibri" panose="020F0502020204030204" pitchFamily="34" charset="0"/>
+              </a:rPr>
             </a:br>
+            <a:r>
+              <a:rPr lang="en-US" sz="2400" b="0" dirty="0">
+                <a:latin typeface="Calibri"/>
+                <a:cs typeface="Calibri"/>
+              </a:rPr>
+              <a:t>Our  Independent variable is</a:t>
+            </a:r>
+            <a:r>
+              <a:rPr lang="en-US" sz="2400" b="0">
+                <a:latin typeface="Calibri"/>
+                <a:cs typeface="Calibri"/>
+              </a:rPr>
+              <a:t>: </a:t>
+            </a:r>
+            <a:r>
+              <a:rPr lang="en-US" sz="2400" b="0">
+                <a:solidFill>
+                  <a:schemeClr val="accent2">
+                    <a:lumMod val="76000"/>
+                  </a:schemeClr>
+                </a:solidFill>
+                <a:latin typeface="Calibri"/>
+                <a:cs typeface="Calibri"/>
+              </a:rPr>
+              <a:t>Duration</a:t>
+            </a:r>
             <a:br>
-              <a:rPr lang="en-US" sz="3600" dirty="0"/>
+              <a:rPr lang="en-US" sz="2400" dirty="0">
+                <a:latin typeface="Calibri"/>
+                <a:cs typeface="Calibri"/>
+              </a:rPr>
             </a:br>
-            <a:endParaRPr lang="en-GB" sz="3600" dirty="0">
-              <a:solidFill>
-                <a:srgbClr val="FF0000"/>
-              </a:solidFill>
-            </a:endParaRPr>
+            <a:r>
+              <a:rPr lang="en-US" sz="2400" b="0" dirty="0">
+                <a:solidFill>
+                  <a:srgbClr val="FF0000"/>
+                </a:solidFill>
+                <a:latin typeface="Calibri"/>
+                <a:cs typeface="Calibri"/>
+              </a:rPr>
+              <a:t>                   </a:t>
+            </a:r>
+            <a:r>
+              <a:rPr lang="en-US" sz="2400" b="0" dirty="0">
+                <a:latin typeface="Calibri"/>
+                <a:cs typeface="Calibri"/>
+              </a:rPr>
+              <a:t>This  Independent variable datatype is : </a:t>
+            </a:r>
+            <a:r>
+              <a:rPr lang="en-US" sz="2400" b="0" dirty="0">
+                <a:solidFill>
+                  <a:srgbClr val="FF0000"/>
+                </a:solidFill>
+                <a:latin typeface="Calibri"/>
+                <a:cs typeface="Calibri"/>
+              </a:rPr>
+              <a:t>Continuous</a:t>
+            </a:r>
+            <a:br>
+              <a:rPr lang="en-US" sz="2400" b="0" dirty="0">
+                <a:solidFill>
+                  <a:srgbClr val="203232"/>
+                </a:solidFill>
+                <a:latin typeface="Calibri"/>
+                <a:cs typeface="Calibri"/>
+              </a:rPr>
+            </a:br>
+            <a:r>
+              <a:rPr lang="en-US" sz="2400" b="0" dirty="0">
+                <a:solidFill>
+                  <a:srgbClr val="203232"/>
+                </a:solidFill>
+                <a:latin typeface="Calibri"/>
+                <a:cs typeface="Calibri"/>
+              </a:rPr>
+              <a:t>Our</a:t>
+            </a:r>
+            <a:r>
+              <a:rPr lang="en-US" sz="2400" b="0" dirty="0">
+                <a:latin typeface="Calibri"/>
+                <a:cs typeface="Calibri"/>
+              </a:rPr>
+              <a:t> Dependent variable is</a:t>
+            </a:r>
+            <a:r>
+              <a:rPr lang="en-US" sz="2400" b="0">
+                <a:latin typeface="Calibri"/>
+                <a:cs typeface="Calibri"/>
+              </a:rPr>
+              <a:t>: </a:t>
+            </a:r>
+            <a:r>
+              <a:rPr lang="en-US" sz="2400" b="0">
+                <a:solidFill>
+                  <a:schemeClr val="accent2">
+                    <a:lumMod val="76000"/>
+                  </a:schemeClr>
+                </a:solidFill>
+                <a:latin typeface="Calibri"/>
+                <a:cs typeface="Calibri"/>
+              </a:rPr>
+              <a:t> </a:t>
+            </a:r>
+            <a:r>
+              <a:rPr lang="en-US" sz="2400" b="0" dirty="0">
+                <a:solidFill>
+                  <a:schemeClr val="accent2">
+                    <a:lumMod val="76000"/>
+                  </a:schemeClr>
+                </a:solidFill>
+                <a:latin typeface="Calibri"/>
+                <a:cs typeface="Calibri"/>
+              </a:rPr>
+              <a:t>Price</a:t>
+            </a:r>
+            <a:br>
+              <a:rPr lang="en-US" sz="2400" b="0" dirty="0">
+                <a:latin typeface="Calibri"/>
+                <a:cs typeface="Calibri"/>
+              </a:rPr>
+            </a:br>
+            <a:r>
+              <a:rPr lang="en-US" sz="2400" b="0" dirty="0">
+                <a:solidFill>
+                  <a:srgbClr val="FF0000"/>
+                </a:solidFill>
+                <a:latin typeface="Calibri"/>
+                <a:cs typeface="Calibri"/>
+              </a:rPr>
+              <a:t>                   </a:t>
+            </a:r>
+            <a:r>
+              <a:rPr lang="en-US" sz="2400" b="0" dirty="0">
+                <a:latin typeface="Calibri"/>
+                <a:cs typeface="Calibri"/>
+              </a:rPr>
+              <a:t>This Dependent variable datatype is : </a:t>
+            </a:r>
+            <a:r>
+              <a:rPr lang="en-US" sz="2400" b="0" dirty="0">
+                <a:solidFill>
+                  <a:srgbClr val="FF0000"/>
+                </a:solidFill>
+                <a:latin typeface="Calibri"/>
+                <a:cs typeface="Calibri"/>
+              </a:rPr>
+              <a:t>Continuous </a:t>
+            </a:r>
           </a:p>
         </p:txBody>
       </p:sp>
     </p:spTree>
     <p:extLst>
       <p:ext uri="{BB962C8B-B14F-4D97-AF65-F5344CB8AC3E}">
-        <p14:creationId xmlns:p14="http://schemas.microsoft.com/office/powerpoint/2010/main" val="32494612"/>
+        <p14:creationId xmlns:p14="http://schemas.microsoft.com/office/powerpoint/2010/main" val="1718004908"/>
       </p:ext>
     </p:extLst>
   </p:cSld>
@@ -5454,33 +5415,71 @@
       </p:grpSpPr>
       <p:sp>
         <p:nvSpPr>
-          <p:cNvPr id="4" name="Slide Number Placeholder 3">
-            <a:extLst>
-              <a:ext uri="{FF2B5EF4-FFF2-40B4-BE49-F238E27FC236}">
-                <a16:creationId xmlns:a16="http://schemas.microsoft.com/office/drawing/2014/main" id="{FF7EDF94-2B89-A21D-BBC0-E455C2D9893B}"/>
-              </a:ext>
-            </a:extLst>
-          </p:cNvPr>
-          <p:cNvSpPr>
-            <a:spLocks noGrp="1"/>
-          </p:cNvSpPr>
-          <p:nvPr>
-            <p:ph type="sldNum" sz="quarter" idx="12"/>
+          <p:cNvPr id="2" name="Subtitle 1">
+            <a:extLst>
+              <a:ext uri="{FF2B5EF4-FFF2-40B4-BE49-F238E27FC236}">
+                <a16:creationId xmlns:a16="http://schemas.microsoft.com/office/drawing/2014/main" id="{8E3CD731-5ACF-B002-247D-243F6E2149EC}"/>
+              </a:ext>
+            </a:extLst>
+          </p:cNvPr>
+          <p:cNvSpPr>
+            <a:spLocks noGrp="1"/>
+          </p:cNvSpPr>
+          <p:nvPr>
+            <p:ph type="subTitle" idx="1"/>
           </p:nvPr>
         </p:nvSpPr>
         <p:spPr>
           <a:xfrm>
-            <a:off x="11269543" y="284375"/>
-            <a:ext cx="558281" cy="221244"/>
+            <a:off x="965289" y="1147638"/>
+            <a:ext cx="9753625" cy="230832"/>
           </a:xfrm>
         </p:spPr>
         <p:txBody>
           <a:bodyPr/>
           <a:lstStyle/>
           <a:p>
+            <a:pPr>
+              <a:spcAft>
+                <a:spcPts val="0"/>
+              </a:spcAft>
+            </a:pPr>
+            <a:r>
+              <a:rPr lang="en-GB"/>
+              <a:t>Our Research Question is:</a:t>
+            </a:r>
+            <a:endParaRPr lang="en-GB" sz="1800">
+              <a:solidFill>
+                <a:srgbClr val="FF0000"/>
+              </a:solidFill>
+            </a:endParaRPr>
+          </a:p>
+        </p:txBody>
+      </p:sp>
+      <p:sp>
+        <p:nvSpPr>
+          <p:cNvPr id="3" name="Footer Placeholder 2">
+            <a:extLst>
+              <a:ext uri="{FF2B5EF4-FFF2-40B4-BE49-F238E27FC236}">
+                <a16:creationId xmlns:a16="http://schemas.microsoft.com/office/drawing/2014/main" id="{3C4D431B-7665-75B0-2D73-5BD588DCB766}"/>
+              </a:ext>
+            </a:extLst>
+          </p:cNvPr>
+          <p:cNvSpPr>
+            <a:spLocks noGrp="1"/>
+          </p:cNvSpPr>
+          <p:nvPr>
+            <p:ph type="ftr" sz="quarter" idx="11"/>
+          </p:nvPr>
+        </p:nvSpPr>
+        <p:spPr/>
+        <p:txBody>
+          <a:bodyPr/>
+          <a:lstStyle/>
+          <a:p>
             <a:r>
               <a:rPr lang="en-US"/>
-              <a:t>4</a:t>
+              <a:t>Airline ticket prices in India</a:t>
             </a:r>
             <a:endParaRPr lang="en-GB"/>
           </a:p>
@@ -5488,34 +5487,63 @@
       </p:sp>
       <p:sp>
         <p:nvSpPr>
-          <p:cNvPr id="9" name="Title 8">
-            <a:extLst>
-              <a:ext uri="{FF2B5EF4-FFF2-40B4-BE49-F238E27FC236}">
-                <a16:creationId xmlns:a16="http://schemas.microsoft.com/office/drawing/2014/main" id="{D1A8E56B-DFF3-4B99-A410-52B14F2E39E7}"/>
-              </a:ext>
-            </a:extLst>
-          </p:cNvPr>
-          <p:cNvSpPr>
-            <a:spLocks noGrp="1"/>
-          </p:cNvSpPr>
-          <p:nvPr>
-            <p:ph type="ctrTitle"/>
+          <p:cNvPr id="4" name="Slide Number Placeholder 3">
+            <a:extLst>
+              <a:ext uri="{FF2B5EF4-FFF2-40B4-BE49-F238E27FC236}">
+                <a16:creationId xmlns:a16="http://schemas.microsoft.com/office/drawing/2014/main" id="{1625FA15-B17F-387B-E383-5505647ABB89}"/>
+              </a:ext>
+            </a:extLst>
+          </p:cNvPr>
+          <p:cNvSpPr>
+            <a:spLocks noGrp="1"/>
+          </p:cNvSpPr>
+          <p:nvPr>
+            <p:ph type="sldNum" sz="quarter" idx="12"/>
           </p:nvPr>
         </p:nvSpPr>
         <p:spPr>
           <a:xfrm>
-            <a:off x="506682" y="791023"/>
-            <a:ext cx="11224108" cy="4478810"/>
+            <a:off x="10616400" y="791022"/>
+            <a:ext cx="622800" cy="230832"/>
           </a:xfrm>
-          <a:ln>
-            <a:solidFill>
-              <a:schemeClr val="bg1"/>
-            </a:solidFill>
-          </a:ln>
         </p:spPr>
         <p:txBody>
+          <a:bodyPr/>
+          <a:lstStyle/>
+          <a:p>
+            <a:r>
+              <a:rPr lang="en-US"/>
+              <a:t>3</a:t>
+            </a:r>
+            <a:endParaRPr lang="en-GB"/>
+          </a:p>
+        </p:txBody>
+      </p:sp>
+      <p:sp>
+        <p:nvSpPr>
+          <p:cNvPr id="5" name="Title 4">
+            <a:extLst>
+              <a:ext uri="{FF2B5EF4-FFF2-40B4-BE49-F238E27FC236}">
+                <a16:creationId xmlns:a16="http://schemas.microsoft.com/office/drawing/2014/main" id="{3440DA25-F620-152B-DE9E-776F7B74DFF0}"/>
+              </a:ext>
+            </a:extLst>
+          </p:cNvPr>
+          <p:cNvSpPr>
+            <a:spLocks noGrp="1"/>
+          </p:cNvSpPr>
+          <p:nvPr>
+            <p:ph type="ctrTitle"/>
+          </p:nvPr>
+        </p:nvSpPr>
+        <p:spPr>
+          <a:xfrm>
+            <a:off x="965289" y="1659468"/>
+            <a:ext cx="10640594" cy="2912532"/>
+          </a:xfrm>
+        </p:spPr>
+        <p:txBody>
           <a:bodyPr>
-            <a:normAutofit/>
+            <a:noAutofit/>
           </a:bodyPr>
           <a:lstStyle/>
           <a:p>
@@ -5525,274 +5553,62 @@
               </a:lnSpc>
             </a:pPr>
             <a:br>
-              <a:rPr lang="en-GB" sz="2400" b="0" spc="0" dirty="0">
-                <a:latin typeface="+mn-lt"/>
+              <a:rPr lang="en-GB" sz="3600" dirty="0">
+                <a:latin typeface="Calibri" panose="020F0502020204030204" pitchFamily="34" charset="0"/>
+                <a:ea typeface="Calibri" panose="020F0502020204030204" pitchFamily="34" charset="0"/>
+                <a:cs typeface="Times New Roman" panose="02020603050405020304" pitchFamily="18" charset="0"/>
               </a:rPr>
             </a:br>
-            <a:r>
-              <a:rPr lang="en-GB" sz="2400" b="0" spc="0" dirty="0">
-                <a:latin typeface="+mn-lt"/>
+            <a:br>
+              <a:rPr lang="en-US" sz="3600" dirty="0"/>
+            </a:br>
+            <a:r>
+              <a:rPr lang="en-GB" sz="3600" dirty="0">
+                <a:latin typeface="Calibri" panose="020F0502020204030204" pitchFamily="34" charset="0"/>
+                <a:ea typeface="Calibri" panose="020F0502020204030204" pitchFamily="34" charset="0"/>
+                <a:cs typeface="Times New Roman" panose="02020603050405020304" pitchFamily="18" charset="0"/>
               </a:rPr>
-              <a:t>1</a:t>
-            </a:r>
-            <a:r>
-              <a:rPr lang="en-GB" sz="2400" spc="0" dirty="0">
-                <a:latin typeface="+mn-lt"/>
-              </a:rPr>
-              <a:t>.  Null hypothesis </a:t>
-            </a:r>
-            <a:r>
-              <a:rPr lang="en-GB" sz="2400" b="0" spc="0" dirty="0">
-                <a:latin typeface="+mn-lt"/>
-              </a:rPr>
-              <a:t>(H</a:t>
-            </a:r>
-            <a:r>
-              <a:rPr lang="en-GB" sz="2400" b="0" i="1" spc="0" baseline="-25000" dirty="0">
-                <a:latin typeface="+mn-lt"/>
-              </a:rPr>
-              <a:t>o</a:t>
-            </a:r>
-            <a:r>
-              <a:rPr lang="en-GB" sz="2400" b="0" spc="0" dirty="0">
-                <a:latin typeface="+mn-lt"/>
-              </a:rPr>
-              <a:t>): </a:t>
-            </a:r>
-            <a:br>
-              <a:rPr lang="en-GB" sz="2400" b="0" spc="0" dirty="0">
-                <a:latin typeface="+mn-lt"/>
-              </a:rPr>
-            </a:br>
-            <a:r>
-              <a:rPr lang="en-US" sz="2400" b="0" spc="0" dirty="0">
+              <a:t>Is there a</a:t>
+            </a:r>
+            <a:r>
+              <a:rPr lang="en-US" sz="3600" dirty="0"/>
+              <a:t> correlation between </a:t>
+            </a:r>
+            <a:r>
+              <a:rPr lang="en-US" sz="3600" dirty="0">
                 <a:solidFill>
-                  <a:srgbClr val="FF0000"/>
-                </a:solidFill>
-                <a:latin typeface="+mn-lt"/>
-              </a:rPr>
-              <a:t>There is </a:t>
-            </a:r>
-            <a:r>
-              <a:rPr lang="en-US" sz="2400" spc="0" dirty="0">
-                <a:solidFill>
-                  <a:srgbClr val="FF0000"/>
-                </a:solidFill>
-                <a:latin typeface="+mn-lt"/>
-              </a:rPr>
-              <a:t>no </a:t>
-            </a:r>
-            <a:r>
-              <a:rPr lang="en-US" sz="2400" b="0" spc="0" dirty="0">
-                <a:solidFill>
-                  <a:srgbClr val="FF0000"/>
-                </a:solidFill>
-                <a:latin typeface="+mn-lt"/>
-              </a:rPr>
-              <a:t>correlation between </a:t>
-            </a:r>
-            <a:r>
-              <a:rPr lang="en-US" sz="2400" spc="0" dirty="0">
-                <a:solidFill>
-                  <a:srgbClr val="FF0000"/>
-                </a:solidFill>
-                <a:latin typeface="+mn-lt"/>
-              </a:rPr>
-              <a:t>flight duration</a:t>
-            </a:r>
-            <a:r>
-              <a:rPr lang="en-US" sz="2400" b="0" spc="0" dirty="0">
-                <a:solidFill>
-                  <a:srgbClr val="FF0000"/>
-                </a:solidFill>
-                <a:latin typeface="+mn-lt"/>
-              </a:rPr>
-              <a:t> and </a:t>
-            </a:r>
-            <a:r>
-              <a:rPr lang="en-US" sz="2400" spc="0" dirty="0">
-                <a:solidFill>
-                  <a:srgbClr val="FF0000"/>
-                </a:solidFill>
-                <a:latin typeface="+mn-lt"/>
-              </a:rPr>
-              <a:t>ticket prices</a:t>
-            </a:r>
-            <a:r>
-              <a:rPr lang="en-US" sz="2400" b="0" spc="0" dirty="0">
-                <a:solidFill>
-                  <a:srgbClr val="FF0000"/>
-                </a:solidFill>
-                <a:latin typeface="+mn-lt"/>
-              </a:rPr>
-              <a:t> for domestic flights departing in India</a:t>
-            </a:r>
-            <a:r>
-              <a:rPr lang="en-US" sz="2400" b="0" spc="0" dirty="0">
-                <a:solidFill>
-                  <a:schemeClr val="accent2">
+                  <a:schemeClr val="accent4">
                     <a:lumMod val="75000"/>
                   </a:schemeClr>
                 </a:solidFill>
-                <a:latin typeface="+mn-lt"/>
               </a:rPr>
-              <a:t>.</a:t>
+              <a:t>price &amp; duration</a:t>
+            </a:r>
+            <a:r>
+              <a:rPr lang="en-US" sz="3600" dirty="0"/>
+              <a:t> for domestic flights in India?.</a:t>
             </a:r>
             <a:br>
-              <a:rPr lang="en-GB" sz="2400" b="0" spc="0" dirty="0">
-                <a:latin typeface="+mn-lt"/>
-              </a:rPr>
+              <a:rPr lang="en-US" sz="3600" dirty="0"/>
             </a:br>
             <a:br>
-              <a:rPr lang="en-GB" sz="2400" b="0" spc="0" dirty="0">
-                <a:latin typeface="+mn-lt"/>
-              </a:rPr>
+              <a:rPr lang="en-US" sz="3600" dirty="0"/>
             </a:br>
             <a:br>
-              <a:rPr lang="en-GB" sz="2400" b="0" spc="0" dirty="0">
-                <a:latin typeface="+mn-lt"/>
-              </a:rPr>
+              <a:rPr lang="en-US" sz="3600" dirty="0"/>
             </a:br>
-            <a:r>
-              <a:rPr lang="en-GB" sz="2400" b="0" spc="0" dirty="0">
-                <a:latin typeface="+mn-lt"/>
-              </a:rPr>
-              <a:t>2. </a:t>
-            </a:r>
-            <a:r>
-              <a:rPr lang="en-GB" sz="2400" spc="0" dirty="0">
-                <a:latin typeface="+mn-lt"/>
-              </a:rPr>
-              <a:t>Alternative hypothesis </a:t>
-            </a:r>
-            <a:r>
-              <a:rPr lang="en-GB" sz="2400" b="0" spc="0" dirty="0">
-                <a:latin typeface="+mn-lt"/>
-              </a:rPr>
-              <a:t>(H</a:t>
-            </a:r>
-            <a:r>
-              <a:rPr lang="en-GB" sz="2400" b="0" spc="0" baseline="-25000" dirty="0">
-                <a:latin typeface="+mn-lt"/>
-              </a:rPr>
-              <a:t>1</a:t>
-            </a:r>
-            <a:r>
-              <a:rPr lang="en-GB" sz="2400" b="0" spc="0" dirty="0">
-                <a:latin typeface="+mn-lt"/>
-              </a:rPr>
-              <a:t>): </a:t>
-            </a:r>
-            <a:br>
-              <a:rPr lang="en-GB" sz="2400" b="0" spc="0" dirty="0">
-                <a:latin typeface="+mn-lt"/>
-              </a:rPr>
-            </a:br>
-            <a:r>
-              <a:rPr lang="en-US" sz="2400" b="0" spc="0" dirty="0">
-                <a:solidFill>
-                  <a:srgbClr val="FF0000"/>
-                </a:solidFill>
-                <a:latin typeface="+mn-lt"/>
-              </a:rPr>
-              <a:t>There is </a:t>
-            </a:r>
-            <a:r>
-              <a:rPr lang="en-US" sz="2400" spc="0" dirty="0">
-                <a:solidFill>
-                  <a:srgbClr val="FF0000"/>
-                </a:solidFill>
-                <a:latin typeface="+mn-lt"/>
-              </a:rPr>
-              <a:t>a</a:t>
-            </a:r>
-            <a:r>
-              <a:rPr lang="en-US" sz="2400" b="0" spc="0" dirty="0">
-                <a:solidFill>
-                  <a:srgbClr val="FF0000"/>
-                </a:solidFill>
-                <a:latin typeface="+mn-lt"/>
-              </a:rPr>
-              <a:t> correlation between </a:t>
-            </a:r>
-            <a:r>
-              <a:rPr lang="en-US" sz="2400" spc="0" dirty="0">
-                <a:solidFill>
-                  <a:srgbClr val="FF0000"/>
-                </a:solidFill>
-                <a:latin typeface="+mn-lt"/>
-              </a:rPr>
-              <a:t>flight duration </a:t>
-            </a:r>
-            <a:r>
-              <a:rPr lang="en-US" sz="2400" b="0" spc="0" dirty="0">
-                <a:solidFill>
-                  <a:srgbClr val="FF0000"/>
-                </a:solidFill>
-                <a:latin typeface="+mn-lt"/>
-              </a:rPr>
-              <a:t>and </a:t>
-            </a:r>
-            <a:r>
-              <a:rPr lang="en-US" sz="2400" spc="0" dirty="0">
-                <a:solidFill>
-                  <a:srgbClr val="FF0000"/>
-                </a:solidFill>
-                <a:latin typeface="+mn-lt"/>
-              </a:rPr>
-              <a:t>ticket prices </a:t>
-            </a:r>
-            <a:r>
-              <a:rPr lang="en-US" sz="2400" b="0" spc="0" dirty="0">
-                <a:solidFill>
-                  <a:srgbClr val="FF0000"/>
-                </a:solidFill>
-                <a:latin typeface="+mn-lt"/>
-              </a:rPr>
-              <a:t>for domestic flights in India.</a:t>
-            </a:r>
-            <a:endParaRPr lang="en-US" sz="2400" b="0" spc="0" dirty="0">
+            <a:endParaRPr lang="en-GB" sz="3600" dirty="0">
               <a:solidFill>
                 <a:srgbClr val="FF0000"/>
               </a:solidFill>
-              <a:cs typeface="Arial"/>
             </a:endParaRPr>
-          </a:p>
-        </p:txBody>
-      </p:sp>
-      <p:sp>
-        <p:nvSpPr>
-          <p:cNvPr id="3" name="Footer Placeholder 2">
-            <a:extLst>
-              <a:ext uri="{FF2B5EF4-FFF2-40B4-BE49-F238E27FC236}">
-                <a16:creationId xmlns:a16="http://schemas.microsoft.com/office/drawing/2014/main" id="{B0F052C8-28E5-DFCC-365F-A7166F5D8C28}"/>
-              </a:ext>
-            </a:extLst>
-          </p:cNvPr>
-          <p:cNvSpPr>
-            <a:spLocks noGrp="1"/>
-          </p:cNvSpPr>
-          <p:nvPr>
-            <p:ph type="ftr" sz="quarter" idx="11"/>
-          </p:nvPr>
-        </p:nvSpPr>
-        <p:spPr/>
-        <p:txBody>
-          <a:bodyPr/>
-          <a:lstStyle/>
-          <a:p>
-            <a:r>
-              <a:rPr lang="en-US"/>
-              <a:t>Airline ticket prices in India</a:t>
-            </a:r>
-            <a:endParaRPr lang="en-GB"/>
           </a:p>
         </p:txBody>
       </p:sp>
     </p:spTree>
     <p:extLst>
       <p:ext uri="{BB962C8B-B14F-4D97-AF65-F5344CB8AC3E}">
-        <p14:creationId xmlns:p14="http://schemas.microsoft.com/office/powerpoint/2010/main" val="1833041803"/>
+        <p14:creationId xmlns:p14="http://schemas.microsoft.com/office/powerpoint/2010/main" val="32494612"/>
       </p:ext>
     </p:extLst>
   </p:cSld>
@@ -5821,28 +5637,33 @@
       </p:grpSpPr>
       <p:sp>
         <p:nvSpPr>
-          <p:cNvPr id="3" name="Footer Placeholder 2">
-            <a:extLst>
-              <a:ext uri="{FF2B5EF4-FFF2-40B4-BE49-F238E27FC236}">
-                <a16:creationId xmlns:a16="http://schemas.microsoft.com/office/drawing/2014/main" id="{1E32129C-44C2-95DE-7FB4-8025AAB3EA1F}"/>
-              </a:ext>
-            </a:extLst>
-          </p:cNvPr>
-          <p:cNvSpPr>
-            <a:spLocks noGrp="1"/>
-          </p:cNvSpPr>
-          <p:nvPr>
-            <p:ph type="ftr" sz="quarter" idx="11"/>
-          </p:nvPr>
-        </p:nvSpPr>
-        <p:spPr/>
+          <p:cNvPr id="4" name="Slide Number Placeholder 3">
+            <a:extLst>
+              <a:ext uri="{FF2B5EF4-FFF2-40B4-BE49-F238E27FC236}">
+                <a16:creationId xmlns:a16="http://schemas.microsoft.com/office/drawing/2014/main" id="{FF7EDF94-2B89-A21D-BBC0-E455C2D9893B}"/>
+              </a:ext>
+            </a:extLst>
+          </p:cNvPr>
+          <p:cNvSpPr>
+            <a:spLocks noGrp="1"/>
+          </p:cNvSpPr>
+          <p:nvPr>
+            <p:ph type="sldNum" sz="quarter" idx="12"/>
+          </p:nvPr>
+        </p:nvSpPr>
+        <p:spPr>
+          <a:xfrm>
+            <a:off x="11269543" y="284375"/>
+            <a:ext cx="558281" cy="221244"/>
+          </a:xfrm>
+        </p:spPr>
         <p:txBody>
           <a:bodyPr/>
           <a:lstStyle/>
           <a:p>
             <a:r>
               <a:rPr lang="en-US"/>
-              <a:t>Airline ticket prices in India</a:t>
+              <a:t>4</a:t>
             </a:r>
             <a:endParaRPr lang="en-GB"/>
           </a:p>
@@ -5850,18 +5671,292 @@
       </p:sp>
       <p:sp>
         <p:nvSpPr>
-          <p:cNvPr id="4" name="Slide Number Placeholder 3">
-            <a:extLst>
-              <a:ext uri="{FF2B5EF4-FFF2-40B4-BE49-F238E27FC236}">
-                <a16:creationId xmlns:a16="http://schemas.microsoft.com/office/drawing/2014/main" id="{9143F542-9925-BCBE-2DA4-35A32A38D9AD}"/>
-              </a:ext>
-            </a:extLst>
-          </p:cNvPr>
-          <p:cNvSpPr>
-            <a:spLocks noGrp="1"/>
-          </p:cNvSpPr>
-          <p:nvPr>
-            <p:ph type="sldNum" sz="quarter" idx="12"/>
+          <p:cNvPr id="9" name="Title 8">
+            <a:extLst>
+              <a:ext uri="{FF2B5EF4-FFF2-40B4-BE49-F238E27FC236}">
+                <a16:creationId xmlns:a16="http://schemas.microsoft.com/office/drawing/2014/main" id="{D1A8E56B-DFF3-4B99-A410-52B14F2E39E7}"/>
+              </a:ext>
+            </a:extLst>
+          </p:cNvPr>
+          <p:cNvSpPr>
+            <a:spLocks noGrp="1"/>
+          </p:cNvSpPr>
+          <p:nvPr>
+            <p:ph type="ctrTitle"/>
+          </p:nvPr>
+        </p:nvSpPr>
+        <p:spPr>
+          <a:xfrm>
+            <a:off x="506682" y="791023"/>
+            <a:ext cx="11224108" cy="4478810"/>
+          </a:xfrm>
+          <a:ln>
+            <a:solidFill>
+              <a:schemeClr val="bg1"/>
+            </a:solidFill>
+          </a:ln>
+        </p:spPr>
+        <p:txBody>
+          <a:bodyPr>
+            <a:normAutofit/>
+          </a:bodyPr>
+          <a:lstStyle/>
+          <a:p>
+            <a:pPr>
+              <a:lnSpc>
+                <a:spcPct val="100000"/>
+              </a:lnSpc>
+            </a:pPr>
+            <a:br>
+              <a:rPr lang="en-GB" sz="2400" b="0" spc="0" dirty="0">
+                <a:latin typeface="+mn-lt"/>
+              </a:rPr>
+            </a:br>
+            <a:r>
+              <a:rPr lang="en-GB" sz="2400" b="0" spc="0" dirty="0">
+                <a:latin typeface="+mn-lt"/>
+              </a:rPr>
+              <a:t>1</a:t>
+            </a:r>
+            <a:r>
+              <a:rPr lang="en-GB" sz="2400" spc="0" dirty="0">
+                <a:latin typeface="+mn-lt"/>
+              </a:rPr>
+              <a:t>.  Null hypothesis </a:t>
+            </a:r>
+            <a:r>
+              <a:rPr lang="en-GB" sz="2400" b="0" spc="0" dirty="0">
+                <a:latin typeface="+mn-lt"/>
+              </a:rPr>
+              <a:t>(H</a:t>
+            </a:r>
+            <a:r>
+              <a:rPr lang="en-GB" sz="2400" b="0" i="1" spc="0" baseline="-25000" dirty="0">
+                <a:latin typeface="+mn-lt"/>
+              </a:rPr>
+              <a:t>o</a:t>
+            </a:r>
+            <a:r>
+              <a:rPr lang="en-GB" sz="2400" b="0" spc="0" dirty="0">
+                <a:latin typeface="+mn-lt"/>
+              </a:rPr>
+              <a:t>): </a:t>
+            </a:r>
+            <a:br>
+              <a:rPr lang="en-GB" sz="2400" b="0" spc="0" dirty="0">
+                <a:latin typeface="+mn-lt"/>
+              </a:rPr>
+            </a:br>
+            <a:r>
+              <a:rPr lang="en-US" sz="2400" b="0" spc="0" dirty="0">
+                <a:solidFill>
+                  <a:srgbClr val="FF0000"/>
+                </a:solidFill>
+                <a:latin typeface="+mn-lt"/>
+              </a:rPr>
+              <a:t>There is </a:t>
+            </a:r>
+            <a:r>
+              <a:rPr lang="en-US" sz="2400" spc="0" dirty="0">
+                <a:solidFill>
+                  <a:srgbClr val="FF0000"/>
+                </a:solidFill>
+                <a:latin typeface="+mn-lt"/>
+              </a:rPr>
+              <a:t>no </a:t>
+            </a:r>
+            <a:r>
+              <a:rPr lang="en-US" sz="2400" b="0" spc="0" dirty="0">
+                <a:solidFill>
+                  <a:srgbClr val="FF0000"/>
+                </a:solidFill>
+                <a:latin typeface="+mn-lt"/>
+              </a:rPr>
+              <a:t>correlation between </a:t>
+            </a:r>
+            <a:r>
+              <a:rPr lang="en-US" sz="2400" spc="0" dirty="0">
+                <a:solidFill>
+                  <a:srgbClr val="FF0000"/>
+                </a:solidFill>
+                <a:latin typeface="+mn-lt"/>
+              </a:rPr>
+              <a:t>price</a:t>
+            </a:r>
+            <a:r>
+              <a:rPr lang="en-US" sz="2400" b="0" spc="0" dirty="0">
+                <a:solidFill>
+                  <a:srgbClr val="FF0000"/>
+                </a:solidFill>
+                <a:latin typeface="+mn-lt"/>
+              </a:rPr>
+              <a:t> and</a:t>
+            </a:r>
+            <a:r>
+              <a:rPr lang="en-US" sz="2400" spc="0" dirty="0">
+                <a:solidFill>
+                  <a:srgbClr val="FF0000"/>
+                </a:solidFill>
+                <a:latin typeface="+mn-lt"/>
+              </a:rPr>
+              <a:t> duration</a:t>
+            </a:r>
+            <a:r>
+              <a:rPr lang="en-US" sz="2400" b="0" spc="0" dirty="0">
+                <a:solidFill>
+                  <a:srgbClr val="FF0000"/>
+                </a:solidFill>
+                <a:latin typeface="+mn-lt"/>
+              </a:rPr>
+              <a:t> for domestic flights in India</a:t>
+            </a:r>
+            <a:r>
+              <a:rPr lang="en-US" sz="2400" b="0" spc="0" dirty="0">
+                <a:solidFill>
+                  <a:schemeClr val="accent2">
+                    <a:lumMod val="75000"/>
+                  </a:schemeClr>
+                </a:solidFill>
+                <a:latin typeface="+mn-lt"/>
+              </a:rPr>
+              <a:t>.</a:t>
+            </a:r>
+            <a:br>
+              <a:rPr lang="en-GB" sz="2400" b="0" spc="0" dirty="0">
+                <a:latin typeface="+mn-lt"/>
+              </a:rPr>
+            </a:br>
+            <a:br>
+              <a:rPr lang="en-GB" sz="2400" b="0" spc="0" dirty="0">
+                <a:latin typeface="+mn-lt"/>
+              </a:rPr>
+            </a:br>
+            <a:br>
+              <a:rPr lang="en-GB" sz="2400" b="0" spc="0" dirty="0">
+                <a:latin typeface="+mn-lt"/>
+              </a:rPr>
+            </a:br>
+            <a:r>
+              <a:rPr lang="en-GB" sz="2400" b="0" spc="0" dirty="0">
+                <a:latin typeface="+mn-lt"/>
+              </a:rPr>
+              <a:t>2. </a:t>
+            </a:r>
+            <a:r>
+              <a:rPr lang="en-GB" sz="2400" spc="0" dirty="0">
+                <a:latin typeface="+mn-lt"/>
+              </a:rPr>
+              <a:t>Alternative hypothesis </a:t>
+            </a:r>
+            <a:r>
+              <a:rPr lang="en-GB" sz="2400" b="0" spc="0" dirty="0">
+                <a:latin typeface="+mn-lt"/>
+              </a:rPr>
+              <a:t>(H</a:t>
+            </a:r>
+            <a:r>
+              <a:rPr lang="en-GB" sz="2400" b="0" spc="0" baseline="-25000" dirty="0">
+                <a:latin typeface="+mn-lt"/>
+              </a:rPr>
+              <a:t>1</a:t>
+            </a:r>
+            <a:r>
+              <a:rPr lang="en-GB" sz="2400" b="0" spc="0" dirty="0">
+                <a:latin typeface="+mn-lt"/>
+              </a:rPr>
+              <a:t>): </a:t>
+            </a:r>
+            <a:br>
+              <a:rPr lang="en-GB" sz="2400" b="0" spc="0" dirty="0">
+                <a:latin typeface="+mn-lt"/>
+              </a:rPr>
+            </a:br>
+            <a:r>
+              <a:rPr lang="en-US" sz="2400" b="0" spc="0" dirty="0">
+                <a:solidFill>
+                  <a:srgbClr val="FF0000"/>
+                </a:solidFill>
+                <a:latin typeface="+mn-lt"/>
+              </a:rPr>
+              <a:t>There is </a:t>
+            </a:r>
+            <a:r>
+              <a:rPr lang="en-US" sz="2400" spc="0" dirty="0">
+                <a:solidFill>
+                  <a:srgbClr val="FF0000"/>
+                </a:solidFill>
+                <a:latin typeface="+mn-lt"/>
+              </a:rPr>
+              <a:t>a</a:t>
+            </a:r>
+            <a:r>
+              <a:rPr lang="en-US" sz="2400" b="0" spc="0" dirty="0">
+                <a:solidFill>
+                  <a:srgbClr val="FF0000"/>
+                </a:solidFill>
+                <a:latin typeface="+mn-lt"/>
+              </a:rPr>
+              <a:t> correlation between</a:t>
+            </a:r>
+            <a:r>
+              <a:rPr lang="en-US" sz="2400" spc="0" dirty="0">
+                <a:solidFill>
+                  <a:srgbClr val="FF0000"/>
+                </a:solidFill>
+                <a:latin typeface="+mn-lt"/>
+              </a:rPr>
+              <a:t> price </a:t>
+            </a:r>
+            <a:r>
+              <a:rPr lang="en-US" sz="2400" b="0" spc="0" dirty="0">
+                <a:solidFill>
+                  <a:srgbClr val="FF0000"/>
+                </a:solidFill>
+                <a:latin typeface="+mn-lt"/>
+              </a:rPr>
+              <a:t>and </a:t>
+            </a:r>
+            <a:r>
+              <a:rPr lang="en-US" sz="2400" spc="0" dirty="0">
+                <a:solidFill>
+                  <a:srgbClr val="FF0000"/>
+                </a:solidFill>
+                <a:latin typeface="+mn-lt"/>
+              </a:rPr>
+              <a:t>duration </a:t>
+            </a:r>
+            <a:r>
+              <a:rPr lang="en-US" sz="2400" b="0" spc="0" dirty="0">
+                <a:solidFill>
+                  <a:srgbClr val="FF0000"/>
+                </a:solidFill>
+                <a:latin typeface="+mn-lt"/>
+              </a:rPr>
+              <a:t>for domestic flights in India.</a:t>
+            </a:r>
+            <a:endParaRPr lang="en-US" sz="2400" b="0" spc="0" dirty="0">
+              <a:solidFill>
+                <a:srgbClr val="FF0000"/>
+              </a:solidFill>
+              <a:cs typeface="Arial"/>
+            </a:endParaRPr>
+          </a:p>
+        </p:txBody>
+      </p:sp>
+      <p:sp>
+        <p:nvSpPr>
+          <p:cNvPr id="3" name="Footer Placeholder 2">
+            <a:extLst>
+              <a:ext uri="{FF2B5EF4-FFF2-40B4-BE49-F238E27FC236}">
+                <a16:creationId xmlns:a16="http://schemas.microsoft.com/office/drawing/2014/main" id="{B0F052C8-28E5-DFCC-365F-A7166F5D8C28}"/>
+              </a:ext>
+            </a:extLst>
+          </p:cNvPr>
+          <p:cNvSpPr>
+            <a:spLocks noGrp="1"/>
+          </p:cNvSpPr>
+          <p:nvPr>
+            <p:ph type="ftr" sz="quarter" idx="11"/>
           </p:nvPr>
         </p:nvSpPr>
         <p:spPr/>
@@ -5869,90 +5964,18 @@
           <a:bodyPr/>
           <a:lstStyle/>
           <a:p>
-            <a:fld id="{E4D355CA-84B7-41B1-B164-8BB439CC7C6B}" type="slidenum">
-              <a:rPr lang="en-GB" smtClean="0"/>
-              <a:pPr/>
-              <a:t>5</a:t>
-            </a:fld>
+            <a:r>
+              <a:rPr lang="en-US"/>
+              <a:t>Airline ticket prices in India</a:t>
+            </a:r>
             <a:endParaRPr lang="en-GB"/>
           </a:p>
         </p:txBody>
       </p:sp>
-      <p:sp>
-        <p:nvSpPr>
-          <p:cNvPr id="5" name="Title 4">
-            <a:extLst>
-              <a:ext uri="{FF2B5EF4-FFF2-40B4-BE49-F238E27FC236}">
-                <a16:creationId xmlns:a16="http://schemas.microsoft.com/office/drawing/2014/main" id="{FEF2E89F-D251-B0A8-2377-FD314948D49C}"/>
-              </a:ext>
-            </a:extLst>
-          </p:cNvPr>
-          <p:cNvSpPr>
-            <a:spLocks noGrp="1"/>
-          </p:cNvSpPr>
-          <p:nvPr>
-            <p:ph type="ctrTitle"/>
-          </p:nvPr>
-        </p:nvSpPr>
-        <p:spPr>
-          <a:xfrm>
-            <a:off x="952800" y="697001"/>
-            <a:ext cx="10031157" cy="649705"/>
-          </a:xfrm>
-        </p:spPr>
-        <p:txBody>
-          <a:bodyPr>
-            <a:noAutofit/>
-          </a:bodyPr>
-          <a:lstStyle/>
-          <a:p>
-            <a:r>
-              <a:rPr lang="en-US" sz="4000"/>
-              <a:t>Dataset – Airline ticket price in India DS-115</a:t>
-            </a:r>
-            <a:endParaRPr lang="en-GB" sz="4000"/>
-          </a:p>
-        </p:txBody>
-      </p:sp>
-      <p:pic>
-        <p:nvPicPr>
-          <p:cNvPr id="7" name="Picture 6">
-            <a:extLst>
-              <a:ext uri="{FF2B5EF4-FFF2-40B4-BE49-F238E27FC236}">
-                <a16:creationId xmlns:a16="http://schemas.microsoft.com/office/drawing/2014/main" id="{A72D388E-BFFF-98AE-4906-C43F8A2AFEA9}"/>
-              </a:ext>
-            </a:extLst>
-          </p:cNvPr>
-          <p:cNvPicPr>
-            <a:picLocks noChangeAspect="1"/>
-          </p:cNvPicPr>
-          <p:nvPr/>
-        </p:nvPicPr>
-        <p:blipFill>
-          <a:blip r:embed="rId2">
-            <a:extLst>
-              <a:ext uri="{28A0092B-C50C-407E-A947-70E740481C1C}">
-                <a14:useLocalDpi xmlns:a14="http://schemas.microsoft.com/office/drawing/2010/main" val="0"/>
-              </a:ext>
-            </a:extLst>
-          </a:blip>
-          <a:srcRect r="9483"/>
-          <a:stretch/>
-        </p:blipFill>
-        <p:spPr>
-          <a:xfrm>
-            <a:off x="753840" y="1486975"/>
-            <a:ext cx="10429075" cy="3884049"/>
-          </a:xfrm>
-          <a:prstGeom prst="rect">
-            <a:avLst/>
-          </a:prstGeom>
-        </p:spPr>
-      </p:pic>
     </p:spTree>
     <p:extLst>
       <p:ext uri="{BB962C8B-B14F-4D97-AF65-F5344CB8AC3E}">
-        <p14:creationId xmlns:p14="http://schemas.microsoft.com/office/powerpoint/2010/main" val="271734506"/>
+        <p14:creationId xmlns:p14="http://schemas.microsoft.com/office/powerpoint/2010/main" val="1833041803"/>
       </p:ext>
     </p:extLst>
   </p:cSld>
@@ -7117,20 +7140,20 @@
 </file>
 
 <file path=customXml/item2.xml><?xml version="1.0" encoding="utf-8"?>
-<p:properties xmlns:p="http://schemas.microsoft.com/office/2006/metadata/properties" xmlns:xsi="http://www.w3.org/2001/XMLSchema-instance" xmlns:pc="http://schemas.microsoft.com/office/infopath/2007/PartnerControls">
-  <documentManagement>
-    <_activity xmlns="e0b66e2b-8ac0-4af7-b642-ec91160566fb" xsi:nil="true"/>
-  </documentManagement>
-</p:properties>
-</file>
-
-<file path=customXml/item3.xml><?xml version="1.0" encoding="utf-8"?>
 <?mso-contentType ?>
 <FormTemplates xmlns="http://schemas.microsoft.com/sharepoint/v3/contenttype/forms">
   <Display>DocumentLibraryForm</Display>
   <Edit>DocumentLibraryForm</Edit>
   <New>DocumentLibraryForm</New>
 </FormTemplates>
+</file>
+
+<file path=customXml/item3.xml><?xml version="1.0" encoding="utf-8"?>
+<p:properties xmlns:p="http://schemas.microsoft.com/office/2006/metadata/properties" xmlns:xsi="http://www.w3.org/2001/XMLSchema-instance" xmlns:pc="http://schemas.microsoft.com/office/infopath/2007/PartnerControls">
+  <documentManagement>
+    <_activity xmlns="e0b66e2b-8ac0-4af7-b642-ec91160566fb" xsi:nil="true"/>
+  </documentManagement>
+</p:properties>
 </file>
 
 <file path=customXml/itemProps1.xml><?xml version="1.0" encoding="utf-8"?>
@@ -7152,6 +7175,14 @@
 </file>
 
 <file path=customXml/itemProps2.xml><?xml version="1.0" encoding="utf-8"?>
+<ds:datastoreItem xmlns:ds="http://schemas.openxmlformats.org/officeDocument/2006/customXml" ds:itemID="{91C521DD-2673-4EE6-BB9B-DC5C3320FFBB}">
+  <ds:schemaRefs>
+    <ds:schemaRef ds:uri="http://schemas.microsoft.com/sharepoint/v3/contenttype/forms"/>
+  </ds:schemaRefs>
+</ds:datastoreItem>
+</file>
+
+<file path=customXml/itemProps3.xml><?xml version="1.0" encoding="utf-8"?>
 <ds:datastoreItem xmlns:ds="http://schemas.openxmlformats.org/officeDocument/2006/customXml" ds:itemID="{EDD1FC41-23C7-41B0-B5F9-BF4CD38AD2ED}">
   <ds:schemaRefs>
     <ds:schemaRef ds:uri="http://schemas.microsoft.com/office/infopath/2007/PartnerControls"/>
@@ -7165,12 +7196,4 @@
     <ds:schemaRef ds:uri="http://www.w3.org/XML/1998/namespace"/>
   </ds:schemaRefs>
 </ds:datastoreItem>
-</file>
-
-<file path=customXml/itemProps3.xml><?xml version="1.0" encoding="utf-8"?>
-<ds:datastoreItem xmlns:ds="http://schemas.openxmlformats.org/officeDocument/2006/customXml" ds:itemID="{91C521DD-2673-4EE6-BB9B-DC5C3320FFBB}">
-  <ds:schemaRefs>
-    <ds:schemaRef ds:uri="http://schemas.microsoft.com/sharepoint/v3/contenttype/forms"/>
-  </ds:schemaRefs>
-</ds:datastoreItem>
 </file>
</xml_diff>

<commit_message>
converted hour to min in dataset and add converting script in repo
</commit_message>
<xml_diff>
--- a/Ds115 Team Research.pptx
+++ b/Ds115 Team Research.pptx
@@ -4933,42 +4933,6 @@
           </a:p>
         </p:txBody>
       </p:sp>
-      <p:pic>
-        <p:nvPicPr>
-          <p:cNvPr id="6" name="Picture 5" descr="A screen shot of a flight schedule&#10;&#10;Description automatically generated">
-            <a:extLst>
-              <a:ext uri="{FF2B5EF4-FFF2-40B4-BE49-F238E27FC236}">
-                <a16:creationId xmlns:a16="http://schemas.microsoft.com/office/drawing/2014/main" id="{01E913B9-78DD-2B07-60AC-6F6FDDC6BAAD}"/>
-              </a:ext>
-            </a:extLst>
-          </p:cNvPr>
-          <p:cNvPicPr>
-            <a:picLocks noChangeAspect="1"/>
-          </p:cNvPicPr>
-          <p:nvPr/>
-        </p:nvPicPr>
-        <p:blipFill>
-          <a:blip r:embed="rId2">
-            <a:extLst>
-              <a:ext uri="{28A0092B-C50C-407E-A947-70E740481C1C}">
-                <a14:useLocalDpi xmlns:a14="http://schemas.microsoft.com/office/drawing/2010/main" val="0"/>
-              </a:ext>
-            </a:extLst>
-          </a:blip>
-          <a:stretch>
-            <a:fillRect/>
-          </a:stretch>
-        </p:blipFill>
-        <p:spPr>
-          <a:xfrm>
-            <a:off x="952801" y="1620253"/>
-            <a:ext cx="9378316" cy="3192379"/>
-          </a:xfrm>
-          <a:prstGeom prst="rect">
-            <a:avLst/>
-          </a:prstGeom>
-        </p:spPr>
-      </p:pic>
       <p:sp>
         <p:nvSpPr>
           <p:cNvPr id="8" name="TextBox 7">
@@ -5005,6 +4969,42 @@
           </a:p>
         </p:txBody>
       </p:sp>
+      <p:pic>
+        <p:nvPicPr>
+          <p:cNvPr id="7" name="Picture 6" descr="A table with time and numbers&#10;&#10;Description automatically generated with medium confidence">
+            <a:extLst>
+              <a:ext uri="{FF2B5EF4-FFF2-40B4-BE49-F238E27FC236}">
+                <a16:creationId xmlns:a16="http://schemas.microsoft.com/office/drawing/2014/main" id="{023E19A0-88E5-4627-9DB1-0C032765A60E}"/>
+              </a:ext>
+            </a:extLst>
+          </p:cNvPr>
+          <p:cNvPicPr>
+            <a:picLocks noChangeAspect="1"/>
+          </p:cNvPicPr>
+          <p:nvPr/>
+        </p:nvPicPr>
+        <p:blipFill>
+          <a:blip r:embed="rId2">
+            <a:extLst>
+              <a:ext uri="{28A0092B-C50C-407E-A947-70E740481C1C}">
+                <a14:useLocalDpi xmlns:a14="http://schemas.microsoft.com/office/drawing/2010/main" val="0"/>
+              </a:ext>
+            </a:extLst>
+          </a:blip>
+          <a:stretch>
+            <a:fillRect/>
+          </a:stretch>
+        </p:blipFill>
+        <p:spPr>
+          <a:xfrm>
+            <a:off x="1089527" y="1676400"/>
+            <a:ext cx="8139139" cy="2960215"/>
+          </a:xfrm>
+          <a:prstGeom prst="rect">
+            <a:avLst/>
+          </a:prstGeom>
+        </p:spPr>
+      </p:pic>
     </p:spTree>
     <p:extLst>
       <p:ext uri="{BB962C8B-B14F-4D97-AF65-F5344CB8AC3E}">
@@ -5586,7 +5586,7 @@
             </a:r>
             <a:r>
               <a:rPr lang="en-US" sz="3600" dirty="0"/>
-              <a:t> for domestic flights in India?.</a:t>
+              <a:t> for domestic flights in India?</a:t>
             </a:r>
             <a:br>
               <a:rPr lang="en-US" sz="3600" dirty="0"/>
@@ -6984,6 +6984,15 @@
 </file>
 
 <file path=customXml/item1.xml><?xml version="1.0" encoding="utf-8"?>
+<?mso-contentType ?>
+<FormTemplates xmlns="http://schemas.microsoft.com/sharepoint/v3/contenttype/forms">
+  <Display>DocumentLibraryForm</Display>
+  <Edit>DocumentLibraryForm</Edit>
+  <New>DocumentLibraryForm</New>
+</FormTemplates>
+</file>
+
+<file path=customXml/item2.xml><?xml version="1.0" encoding="utf-8"?>
 <ct:contentTypeSchema xmlns:ct="http://schemas.microsoft.com/office/2006/metadata/contentType" xmlns:ma="http://schemas.microsoft.com/office/2006/metadata/properties/metaAttributes" ct:_="" ma:_="" ma:contentTypeName="Document" ma:contentTypeID="0x0101009B7AB4019A25F14E9AEB5769007937FC" ma:contentTypeVersion="6" ma:contentTypeDescription="Create a new document." ma:contentTypeScope="" ma:versionID="e39f1abe86898bb34110ac7c8f633e2d">
   <xsd:schema xmlns:xsd="http://www.w3.org/2001/XMLSchema" xmlns:xs="http://www.w3.org/2001/XMLSchema" xmlns:p="http://schemas.microsoft.com/office/2006/metadata/properties" xmlns:ns3="e0b66e2b-8ac0-4af7-b642-ec91160566fb" targetNamespace="http://schemas.microsoft.com/office/2006/metadata/properties" ma:root="true" ma:fieldsID="2ecc8d36e7f985748b7213f4e0ac8a99" ns3:_="">
     <xsd:import namespace="e0b66e2b-8ac0-4af7-b642-ec91160566fb"/>
@@ -7139,15 +7148,6 @@
 </ct:contentTypeSchema>
 </file>
 
-<file path=customXml/item2.xml><?xml version="1.0" encoding="utf-8"?>
-<?mso-contentType ?>
-<FormTemplates xmlns="http://schemas.microsoft.com/sharepoint/v3/contenttype/forms">
-  <Display>DocumentLibraryForm</Display>
-  <Edit>DocumentLibraryForm</Edit>
-  <New>DocumentLibraryForm</New>
-</FormTemplates>
-</file>
-
 <file path=customXml/item3.xml><?xml version="1.0" encoding="utf-8"?>
 <p:properties xmlns:p="http://schemas.microsoft.com/office/2006/metadata/properties" xmlns:xsi="http://www.w3.org/2001/XMLSchema-instance" xmlns:pc="http://schemas.microsoft.com/office/infopath/2007/PartnerControls">
   <documentManagement>
@@ -7157,6 +7157,14 @@
 </file>
 
 <file path=customXml/itemProps1.xml><?xml version="1.0" encoding="utf-8"?>
+<ds:datastoreItem xmlns:ds="http://schemas.openxmlformats.org/officeDocument/2006/customXml" ds:itemID="{91C521DD-2673-4EE6-BB9B-DC5C3320FFBB}">
+  <ds:schemaRefs>
+    <ds:schemaRef ds:uri="http://schemas.microsoft.com/sharepoint/v3/contenttype/forms"/>
+  </ds:schemaRefs>
+</ds:datastoreItem>
+</file>
+
+<file path=customXml/itemProps2.xml><?xml version="1.0" encoding="utf-8"?>
 <ds:datastoreItem xmlns:ds="http://schemas.openxmlformats.org/officeDocument/2006/customXml" ds:itemID="{07367F45-F2BC-4BD7-8140-D40435D374AB}">
   <ds:schemaRefs>
     <ds:schemaRef ds:uri="e0b66e2b-8ac0-4af7-b642-ec91160566fb"/>
@@ -7170,14 +7178,6 @@
     <ds:schemaRef ds:uri="http://schemas.microsoft.com/office/infopath/2007/PartnerControls"/>
     <ds:schemaRef ds:uri="http://schemas.openxmlformats.org/package/2006/metadata/core-properties"/>
     <ds:schemaRef ds:uri="http://www.w3.org/2001/XMLSchema"/>
-  </ds:schemaRefs>
-</ds:datastoreItem>
-</file>
-
-<file path=customXml/itemProps2.xml><?xml version="1.0" encoding="utf-8"?>
-<ds:datastoreItem xmlns:ds="http://schemas.openxmlformats.org/officeDocument/2006/customXml" ds:itemID="{91C521DD-2673-4EE6-BB9B-DC5C3320FFBB}">
-  <ds:schemaRefs>
-    <ds:schemaRef ds:uri="http://schemas.microsoft.com/sharepoint/v3/contenttype/forms"/>
   </ds:schemaRefs>
 </ds:datastoreItem>
 </file>

</xml_diff>